<commit_message>
He añadido un par de diapositivas incompletas para continuarlas más tarde
</commit_message>
<xml_diff>
--- a/PM-TEMA 8 v1.pptx
+++ b/PM-TEMA 8 v1.pptx
@@ -10,6 +10,7 @@
     <p:sldId id="260" r:id="rId4"/>
     <p:sldId id="261" r:id="rId5"/>
     <p:sldId id="262" r:id="rId6"/>
+    <p:sldId id="263" r:id="rId7"/>
   </p:sldIdLst>
   <p:sldSz cx="12192000" cy="6858000"/>
   <p:notesSz cx="6858000" cy="9144000"/>
@@ -11594,6 +11595,195 @@
           </a:p>
         </p:txBody>
       </p:sp>
+      <p:pic>
+        <p:nvPicPr>
+          <p:cNvPr id="4" name="Marcador de contenido 3"/>
+          <p:cNvPicPr>
+            <a:picLocks noGrp="1" noChangeAspect="1"/>
+          </p:cNvPicPr>
+          <p:nvPr>
+            <p:ph idx="1"/>
+          </p:nvPr>
+        </p:nvPicPr>
+        <p:blipFill>
+          <a:blip r:embed="rId2"/>
+          <a:stretch>
+            <a:fillRect/>
+          </a:stretch>
+        </p:blipFill>
+        <p:spPr>
+          <a:xfrm>
+            <a:off x="810000" y="2805100"/>
+            <a:ext cx="2301472" cy="2301472"/>
+          </a:xfrm>
+          <a:prstGeom prst="rect">
+            <a:avLst/>
+          </a:prstGeom>
+        </p:spPr>
+      </p:pic>
+      <p:pic>
+        <p:nvPicPr>
+          <p:cNvPr id="2052" name="Picture 4" descr="Resultado de imagen de google play"/>
+          <p:cNvPicPr>
+            <a:picLocks noChangeAspect="1" noChangeArrowheads="1"/>
+          </p:cNvPicPr>
+          <p:nvPr/>
+        </p:nvPicPr>
+        <p:blipFill>
+          <a:blip r:embed="rId3">
+            <a:extLst>
+              <a:ext uri="{28A0092B-C50C-407E-A947-70E740481C1C}">
+                <a14:useLocalDpi xmlns:a14="http://schemas.microsoft.com/office/drawing/2010/main" val="0"/>
+              </a:ext>
+            </a:extLst>
+          </a:blip>
+          <a:srcRect/>
+          <a:stretch>
+            <a:fillRect/>
+          </a:stretch>
+        </p:blipFill>
+        <p:spPr bwMode="auto">
+          <a:xfrm>
+            <a:off x="4009293" y="2545117"/>
+            <a:ext cx="3255840" cy="2441880"/>
+          </a:xfrm>
+          <a:prstGeom prst="rect">
+            <a:avLst/>
+          </a:prstGeom>
+          <a:noFill/>
+          <a:extLst>
+            <a:ext uri="{909E8E84-426E-40DD-AFC4-6F175D3DCCD1}">
+              <a14:hiddenFill xmlns:a14="http://schemas.microsoft.com/office/drawing/2010/main">
+                <a:solidFill>
+                  <a:srgbClr val="FFFFFF"/>
+                </a:solidFill>
+              </a14:hiddenFill>
+            </a:ext>
+          </a:extLst>
+        </p:spPr>
+      </p:pic>
+      <p:pic>
+        <p:nvPicPr>
+          <p:cNvPr id="2054" name="Picture 6" descr="Resultado de imagen de steam"/>
+          <p:cNvPicPr>
+            <a:picLocks noChangeAspect="1" noChangeArrowheads="1"/>
+          </p:cNvPicPr>
+          <p:nvPr/>
+        </p:nvPicPr>
+        <p:blipFill>
+          <a:blip r:embed="rId4">
+            <a:extLst>
+              <a:ext uri="{28A0092B-C50C-407E-A947-70E740481C1C}">
+                <a14:useLocalDpi xmlns:a14="http://schemas.microsoft.com/office/drawing/2010/main" val="0"/>
+              </a:ext>
+            </a:extLst>
+          </a:blip>
+          <a:srcRect/>
+          <a:stretch>
+            <a:fillRect/>
+          </a:stretch>
+        </p:blipFill>
+        <p:spPr bwMode="auto">
+          <a:xfrm>
+            <a:off x="8032652" y="2545117"/>
+            <a:ext cx="2561455" cy="2561455"/>
+          </a:xfrm>
+          <a:prstGeom prst="rect">
+            <a:avLst/>
+          </a:prstGeom>
+          <a:noFill/>
+          <a:extLst>
+            <a:ext uri="{909E8E84-426E-40DD-AFC4-6F175D3DCCD1}">
+              <a14:hiddenFill xmlns:a14="http://schemas.microsoft.com/office/drawing/2010/main">
+                <a:solidFill>
+                  <a:srgbClr val="FFFFFF"/>
+                </a:solidFill>
+              </a14:hiddenFill>
+            </a:ext>
+          </a:extLst>
+        </p:spPr>
+      </p:pic>
+      <p:sp>
+        <p:nvSpPr>
+          <p:cNvPr id="6" name="CuadroTexto 5"/>
+          <p:cNvSpPr txBox="1"/>
+          <p:nvPr/>
+        </p:nvSpPr>
+        <p:spPr>
+          <a:xfrm>
+            <a:off x="943963" y="5363664"/>
+            <a:ext cx="2284600" cy="369332"/>
+          </a:xfrm>
+          <a:prstGeom prst="rect">
+            <a:avLst/>
+          </a:prstGeom>
+          <a:noFill/>
+        </p:spPr>
+        <p:txBody>
+          <a:bodyPr wrap="none" rtlCol="0">
+            <a:spAutoFit/>
+          </a:bodyPr>
+          <a:lstStyle/>
+          <a:p>
+            <a:r>
+              <a:rPr lang="es-ES" dirty="0"/>
+              <a:t>App Store (Apple)</a:t>
+            </a:r>
+          </a:p>
+        </p:txBody>
+      </p:sp>
+    </p:spTree>
+    <p:extLst>
+      <p:ext uri="{BB962C8B-B14F-4D97-AF65-F5344CB8AC3E}">
+        <p14:creationId xmlns:p14="http://schemas.microsoft.com/office/powerpoint/2010/main" val="2468594546"/>
+      </p:ext>
+    </p:extLst>
+  </p:cSld>
+  <p:clrMapOvr>
+    <a:masterClrMapping/>
+  </p:clrMapOvr>
+</p:sld>
+</file>
+
+<file path=ppt/slides/slide6.xml><?xml version="1.0" encoding="utf-8"?>
+<p:sld xmlns:a="http://schemas.openxmlformats.org/drawingml/2006/main" xmlns:r="http://schemas.openxmlformats.org/officeDocument/2006/relationships" xmlns:p="http://schemas.openxmlformats.org/presentationml/2006/main">
+  <p:cSld>
+    <p:spTree>
+      <p:nvGrpSpPr>
+        <p:cNvPr id="1" name=""/>
+        <p:cNvGrpSpPr/>
+        <p:nvPr/>
+      </p:nvGrpSpPr>
+      <p:grpSpPr>
+        <a:xfrm>
+          <a:off x="0" y="0"/>
+          <a:ext cx="0" cy="0"/>
+          <a:chOff x="0" y="0"/>
+          <a:chExt cx="0" cy="0"/>
+        </a:xfrm>
+      </p:grpSpPr>
+      <p:sp>
+        <p:nvSpPr>
+          <p:cNvPr id="2" name="Título 1"/>
+          <p:cNvSpPr>
+            <a:spLocks noGrp="1"/>
+          </p:cNvSpPr>
+          <p:nvPr>
+            <p:ph type="title"/>
+          </p:nvPr>
+        </p:nvSpPr>
+        <p:spPr/>
+        <p:txBody>
+          <a:bodyPr/>
+          <a:lstStyle/>
+          <a:p>
+            <a:r>
+              <a:rPr lang="es-ES" dirty="0"/>
+              <a:t>Nuevas formas de uso</a:t>
+            </a:r>
+          </a:p>
+        </p:txBody>
+      </p:sp>
       <p:sp>
         <p:nvSpPr>
           <p:cNvPr id="3" name="Marcador de contenido 2"/>
@@ -11609,14 +11799,70 @@
           <a:bodyPr/>
           <a:lstStyle/>
           <a:p>
-            <a:endParaRPr lang="es-ES"/>
+            <a:r>
+              <a:rPr lang="es-ES" dirty="0"/>
+              <a:t>Tiendas de aplicaciones móviles (Google </a:t>
+            </a:r>
+            <a:r>
+              <a:rPr lang="es-ES" dirty="0" err="1"/>
+              <a:t>play</a:t>
+            </a:r>
+            <a:r>
+              <a:rPr lang="es-ES" dirty="0"/>
+              <a:t>, App Store).</a:t>
+            </a:r>
+          </a:p>
+          <a:p>
+            <a:r>
+              <a:rPr lang="es-ES" dirty="0"/>
+              <a:t>Tiendas de videojuegos en soporte digital (</a:t>
+            </a:r>
+            <a:r>
+              <a:rPr lang="es-ES" dirty="0" err="1"/>
+              <a:t>Steam</a:t>
+            </a:r>
+            <a:r>
+              <a:rPr lang="es-ES" dirty="0"/>
+              <a:t>).</a:t>
+            </a:r>
+          </a:p>
+          <a:p>
+            <a:r>
+              <a:rPr lang="es-ES" dirty="0"/>
+              <a:t>Tiendas de aplicaciones para Smart TV (Samsung, Android).</a:t>
+            </a:r>
+          </a:p>
+          <a:p>
+            <a:r>
+              <a:rPr lang="es-ES" dirty="0"/>
+              <a:t>Tiendas de aplicaciones para Smart </a:t>
+            </a:r>
+            <a:r>
+              <a:rPr lang="es-ES" dirty="0" err="1"/>
+              <a:t>Watch</a:t>
+            </a:r>
+            <a:r>
+              <a:rPr lang="es-ES" dirty="0"/>
+              <a:t>.</a:t>
+            </a:r>
+          </a:p>
+          <a:p>
+            <a:r>
+              <a:rPr lang="es-ES" dirty="0"/>
+              <a:t>Tienda de aplicaciones para PC (Tienda </a:t>
+            </a:r>
+            <a:r>
+              <a:rPr lang="es-ES"/>
+              <a:t>de Windows).</a:t>
+            </a:r>
+            <a:endParaRPr lang="es-ES" dirty="0"/>
           </a:p>
         </p:txBody>
       </p:sp>
     </p:spTree>
     <p:extLst>
       <p:ext uri="{BB962C8B-B14F-4D97-AF65-F5344CB8AC3E}">
-        <p14:creationId xmlns:p14="http://schemas.microsoft.com/office/powerpoint/2010/main" val="2468594546"/>
+        <p14:creationId xmlns:p14="http://schemas.microsoft.com/office/powerpoint/2010/main" val="4125211534"/>
       </p:ext>
     </p:extLst>
   </p:cSld>

</xml_diff>

<commit_message>
Vuelvo a subir el powerpoint que he añadido más diapositivas
</commit_message>
<xml_diff>
--- a/PM-TEMA 8 v1.pptx
+++ b/PM-TEMA 8 v1.pptx
@@ -11,6 +11,10 @@
     <p:sldId id="261" r:id="rId5"/>
     <p:sldId id="262" r:id="rId6"/>
     <p:sldId id="263" r:id="rId7"/>
+    <p:sldId id="264" r:id="rId8"/>
+    <p:sldId id="265" r:id="rId9"/>
+    <p:sldId id="266" r:id="rId10"/>
+    <p:sldId id="267" r:id="rId11"/>
   </p:sldIdLst>
   <p:sldSz cx="12192000" cy="6858000"/>
   <p:notesSz cx="6858000" cy="9144000"/>
@@ -11050,6 +11054,164 @@
 </p:sld>
 </file>
 
+<file path=ppt/slides/slide10.xml><?xml version="1.0" encoding="utf-8"?>
+<p:sld xmlns:a="http://schemas.openxmlformats.org/drawingml/2006/main" xmlns:r="http://schemas.openxmlformats.org/officeDocument/2006/relationships" xmlns:p="http://schemas.openxmlformats.org/presentationml/2006/main">
+  <p:cSld>
+    <p:spTree>
+      <p:nvGrpSpPr>
+        <p:cNvPr id="1" name=""/>
+        <p:cNvGrpSpPr/>
+        <p:nvPr/>
+      </p:nvGrpSpPr>
+      <p:grpSpPr>
+        <a:xfrm>
+          <a:off x="0" y="0"/>
+          <a:ext cx="0" cy="0"/>
+          <a:chOff x="0" y="0"/>
+          <a:chExt cx="0" cy="0"/>
+        </a:xfrm>
+      </p:grpSpPr>
+      <p:sp>
+        <p:nvSpPr>
+          <p:cNvPr id="2" name="Título 1"/>
+          <p:cNvSpPr>
+            <a:spLocks noGrp="1"/>
+          </p:cNvSpPr>
+          <p:nvPr>
+            <p:ph type="title"/>
+          </p:nvPr>
+        </p:nvSpPr>
+        <p:spPr/>
+        <p:txBody>
+          <a:bodyPr/>
+          <a:lstStyle/>
+          <a:p>
+            <a:r>
+              <a:rPr lang="es-ES" dirty="0"/>
+              <a:t>Tienda de aplicaciones para PC</a:t>
+            </a:r>
+          </a:p>
+        </p:txBody>
+      </p:sp>
+      <p:pic>
+        <p:nvPicPr>
+          <p:cNvPr id="6146" name="Picture 2" descr="Resultado de imagen de tienda windows"/>
+          <p:cNvPicPr>
+            <a:picLocks noChangeAspect="1" noChangeArrowheads="1"/>
+          </p:cNvPicPr>
+          <p:nvPr/>
+        </p:nvPicPr>
+        <p:blipFill>
+          <a:blip r:embed="rId2">
+            <a:extLst>
+              <a:ext uri="{28A0092B-C50C-407E-A947-70E740481C1C}">
+                <a14:useLocalDpi xmlns:a14="http://schemas.microsoft.com/office/drawing/2010/main" val="0"/>
+              </a:ext>
+            </a:extLst>
+          </a:blip>
+          <a:srcRect/>
+          <a:stretch>
+            <a:fillRect/>
+          </a:stretch>
+        </p:blipFill>
+        <p:spPr bwMode="auto">
+          <a:xfrm>
+            <a:off x="478302" y="2345228"/>
+            <a:ext cx="3738782" cy="1982687"/>
+          </a:xfrm>
+          <a:prstGeom prst="rect">
+            <a:avLst/>
+          </a:prstGeom>
+          <a:noFill/>
+          <a:extLst>
+            <a:ext uri="{909E8E84-426E-40DD-AFC4-6F175D3DCCD1}">
+              <a14:hiddenFill xmlns:a14="http://schemas.microsoft.com/office/drawing/2010/main">
+                <a:solidFill>
+                  <a:srgbClr val="FFFFFF"/>
+                </a:solidFill>
+              </a14:hiddenFill>
+            </a:ext>
+          </a:extLst>
+        </p:spPr>
+      </p:pic>
+      <p:pic>
+        <p:nvPicPr>
+          <p:cNvPr id="6148" name="Picture 4" descr="Resultado de imagen de centro de software de ubuntu"/>
+          <p:cNvPicPr>
+            <a:picLocks noChangeAspect="1" noChangeArrowheads="1"/>
+          </p:cNvPicPr>
+          <p:nvPr/>
+        </p:nvPicPr>
+        <p:blipFill>
+          <a:blip r:embed="rId3">
+            <a:extLst>
+              <a:ext uri="{28A0092B-C50C-407E-A947-70E740481C1C}">
+                <a14:useLocalDpi xmlns:a14="http://schemas.microsoft.com/office/drawing/2010/main" val="0"/>
+              </a:ext>
+            </a:extLst>
+          </a:blip>
+          <a:srcRect/>
+          <a:stretch>
+            <a:fillRect/>
+          </a:stretch>
+        </p:blipFill>
+        <p:spPr bwMode="auto">
+          <a:xfrm>
+            <a:off x="7596554" y="2174301"/>
+            <a:ext cx="3823091" cy="2324539"/>
+          </a:xfrm>
+          <a:prstGeom prst="rect">
+            <a:avLst/>
+          </a:prstGeom>
+          <a:noFill/>
+          <a:extLst>
+            <a:ext uri="{909E8E84-426E-40DD-AFC4-6F175D3DCCD1}">
+              <a14:hiddenFill xmlns:a14="http://schemas.microsoft.com/office/drawing/2010/main">
+                <a:solidFill>
+                  <a:srgbClr val="FFFFFF"/>
+                </a:solidFill>
+              </a14:hiddenFill>
+            </a:ext>
+          </a:extLst>
+        </p:spPr>
+      </p:pic>
+      <p:pic>
+        <p:nvPicPr>
+          <p:cNvPr id="4" name="Imagen 3"/>
+          <p:cNvPicPr>
+            <a:picLocks noChangeAspect="1"/>
+          </p:cNvPicPr>
+          <p:nvPr/>
+        </p:nvPicPr>
+        <p:blipFill>
+          <a:blip r:embed="rId4"/>
+          <a:stretch>
+            <a:fillRect/>
+          </a:stretch>
+        </p:blipFill>
+        <p:spPr>
+          <a:xfrm>
+            <a:off x="4763720" y="4289130"/>
+            <a:ext cx="2286198" cy="2286198"/>
+          </a:xfrm>
+          <a:prstGeom prst="rect">
+            <a:avLst/>
+          </a:prstGeom>
+        </p:spPr>
+      </p:pic>
+    </p:spTree>
+    <p:extLst>
+      <p:ext uri="{BB962C8B-B14F-4D97-AF65-F5344CB8AC3E}">
+        <p14:creationId xmlns:p14="http://schemas.microsoft.com/office/powerpoint/2010/main" val="3562754852"/>
+      </p:ext>
+    </p:extLst>
+  </p:cSld>
+  <p:clrMapOvr>
+    <a:masterClrMapping/>
+  </p:clrMapOvr>
+</p:sld>
+</file>
+
 <file path=ppt/slides/slide2.xml><?xml version="1.0" encoding="utf-8"?>
 <p:sld xmlns:a="http://schemas.openxmlformats.org/drawingml/2006/main" xmlns:r="http://schemas.openxmlformats.org/officeDocument/2006/relationships" xmlns:p="http://schemas.openxmlformats.org/presentationml/2006/main">
   <p:cSld>
@@ -11613,7 +11775,7 @@
         </p:blipFill>
         <p:spPr>
           <a:xfrm>
-            <a:off x="810000" y="2805100"/>
+            <a:off x="810000" y="2615321"/>
             <a:ext cx="2301472" cy="2301472"/>
           </a:xfrm>
           <a:prstGeom prst="rect">
@@ -11849,13 +12011,8 @@
           <a:p>
             <a:r>
               <a:rPr lang="es-ES" dirty="0"/>
-              <a:t>Tienda de aplicaciones para PC (Tienda </a:t>
+              <a:t>Tienda de aplicaciones para PC (Tienda de Windows).</a:t>
             </a:r>
-            <a:r>
-              <a:rPr lang="es-ES"/>
-              <a:t>de Windows).</a:t>
-            </a:r>
-            <a:endParaRPr lang="es-ES" dirty="0"/>
           </a:p>
         </p:txBody>
       </p:sp>
@@ -11863,6 +12020,472 @@
     <p:extLst>
       <p:ext uri="{BB962C8B-B14F-4D97-AF65-F5344CB8AC3E}">
         <p14:creationId xmlns:p14="http://schemas.microsoft.com/office/powerpoint/2010/main" val="4125211534"/>
+      </p:ext>
+    </p:extLst>
+  </p:cSld>
+  <p:clrMapOvr>
+    <a:masterClrMapping/>
+  </p:clrMapOvr>
+</p:sld>
+</file>
+
+<file path=ppt/slides/slide7.xml><?xml version="1.0" encoding="utf-8"?>
+<p:sld xmlns:a="http://schemas.openxmlformats.org/drawingml/2006/main" xmlns:r="http://schemas.openxmlformats.org/officeDocument/2006/relationships" xmlns:p="http://schemas.openxmlformats.org/presentationml/2006/main">
+  <p:cSld>
+    <p:spTree>
+      <p:nvGrpSpPr>
+        <p:cNvPr id="1" name=""/>
+        <p:cNvGrpSpPr/>
+        <p:nvPr/>
+      </p:nvGrpSpPr>
+      <p:grpSpPr>
+        <a:xfrm>
+          <a:off x="0" y="0"/>
+          <a:ext cx="0" cy="0"/>
+          <a:chOff x="0" y="0"/>
+          <a:chExt cx="0" cy="0"/>
+        </a:xfrm>
+      </p:grpSpPr>
+      <p:sp>
+        <p:nvSpPr>
+          <p:cNvPr id="2" name="Título 1"/>
+          <p:cNvSpPr>
+            <a:spLocks noGrp="1"/>
+          </p:cNvSpPr>
+          <p:nvPr>
+            <p:ph type="title"/>
+          </p:nvPr>
+        </p:nvSpPr>
+        <p:spPr/>
+        <p:txBody>
+          <a:bodyPr/>
+          <a:lstStyle/>
+          <a:p>
+            <a:r>
+              <a:rPr lang="es-ES" dirty="0"/>
+              <a:t>Tiendas de aplicaciones móviles</a:t>
+            </a:r>
+          </a:p>
+        </p:txBody>
+      </p:sp>
+      <p:pic>
+        <p:nvPicPr>
+          <p:cNvPr id="4" name="Marcador de contenido 3"/>
+          <p:cNvPicPr>
+            <a:picLocks noGrp="1" noChangeAspect="1"/>
+          </p:cNvPicPr>
+          <p:nvPr>
+            <p:ph idx="1"/>
+          </p:nvPr>
+        </p:nvPicPr>
+        <p:blipFill>
+          <a:blip r:embed="rId2"/>
+          <a:stretch>
+            <a:fillRect/>
+          </a:stretch>
+        </p:blipFill>
+        <p:spPr>
+          <a:xfrm>
+            <a:off x="1069144" y="2784267"/>
+            <a:ext cx="2174863" cy="2174863"/>
+          </a:xfrm>
+          <a:prstGeom prst="rect">
+            <a:avLst/>
+          </a:prstGeom>
+        </p:spPr>
+      </p:pic>
+      <p:pic>
+        <p:nvPicPr>
+          <p:cNvPr id="5" name="Picture 4" descr="Resultado de imagen de google play"/>
+          <p:cNvPicPr>
+            <a:picLocks noChangeAspect="1" noChangeArrowheads="1"/>
+          </p:cNvPicPr>
+          <p:nvPr/>
+        </p:nvPicPr>
+        <p:blipFill>
+          <a:blip r:embed="rId3">
+            <a:extLst>
+              <a:ext uri="{28A0092B-C50C-407E-A947-70E740481C1C}">
+                <a14:useLocalDpi xmlns:a14="http://schemas.microsoft.com/office/drawing/2010/main" val="0"/>
+              </a:ext>
+            </a:extLst>
+          </a:blip>
+          <a:srcRect/>
+          <a:stretch>
+            <a:fillRect/>
+          </a:stretch>
+        </p:blipFill>
+        <p:spPr bwMode="auto">
+          <a:xfrm>
+            <a:off x="3885003" y="2735163"/>
+            <a:ext cx="3030758" cy="2273069"/>
+          </a:xfrm>
+          <a:prstGeom prst="rect">
+            <a:avLst/>
+          </a:prstGeom>
+          <a:noFill/>
+          <a:extLst>
+            <a:ext uri="{909E8E84-426E-40DD-AFC4-6F175D3DCCD1}">
+              <a14:hiddenFill xmlns:a14="http://schemas.microsoft.com/office/drawing/2010/main">
+                <a:solidFill>
+                  <a:srgbClr val="FFFFFF"/>
+                </a:solidFill>
+              </a14:hiddenFill>
+            </a:ext>
+          </a:extLst>
+        </p:spPr>
+      </p:pic>
+      <p:pic>
+        <p:nvPicPr>
+          <p:cNvPr id="3074" name="Picture 2" descr="Resultado de imagen de windows store"/>
+          <p:cNvPicPr>
+            <a:picLocks noChangeAspect="1" noChangeArrowheads="1"/>
+          </p:cNvPicPr>
+          <p:nvPr/>
+        </p:nvPicPr>
+        <p:blipFill>
+          <a:blip r:embed="rId4">
+            <a:extLst>
+              <a:ext uri="{28A0092B-C50C-407E-A947-70E740481C1C}">
+                <a14:useLocalDpi xmlns:a14="http://schemas.microsoft.com/office/drawing/2010/main" val="0"/>
+              </a:ext>
+            </a:extLst>
+          </a:blip>
+          <a:srcRect/>
+          <a:stretch>
+            <a:fillRect/>
+          </a:stretch>
+        </p:blipFill>
+        <p:spPr bwMode="auto">
+          <a:xfrm>
+            <a:off x="7556758" y="3234885"/>
+            <a:ext cx="3825240" cy="1724245"/>
+          </a:xfrm>
+          <a:prstGeom prst="rect">
+            <a:avLst/>
+          </a:prstGeom>
+          <a:noFill/>
+          <a:extLst>
+            <a:ext uri="{909E8E84-426E-40DD-AFC4-6F175D3DCCD1}">
+              <a14:hiddenFill xmlns:a14="http://schemas.microsoft.com/office/drawing/2010/main">
+                <a:solidFill>
+                  <a:srgbClr val="FFFFFF"/>
+                </a:solidFill>
+              </a14:hiddenFill>
+            </a:ext>
+          </a:extLst>
+        </p:spPr>
+      </p:pic>
+    </p:spTree>
+    <p:extLst>
+      <p:ext uri="{BB962C8B-B14F-4D97-AF65-F5344CB8AC3E}">
+        <p14:creationId xmlns:p14="http://schemas.microsoft.com/office/powerpoint/2010/main" val="941416556"/>
+      </p:ext>
+    </p:extLst>
+  </p:cSld>
+  <p:clrMapOvr>
+    <a:masterClrMapping/>
+  </p:clrMapOvr>
+</p:sld>
+</file>
+
+<file path=ppt/slides/slide8.xml><?xml version="1.0" encoding="utf-8"?>
+<p:sld xmlns:a="http://schemas.openxmlformats.org/drawingml/2006/main" xmlns:r="http://schemas.openxmlformats.org/officeDocument/2006/relationships" xmlns:p="http://schemas.openxmlformats.org/presentationml/2006/main">
+  <p:cSld>
+    <p:spTree>
+      <p:nvGrpSpPr>
+        <p:cNvPr id="1" name=""/>
+        <p:cNvGrpSpPr/>
+        <p:nvPr/>
+      </p:nvGrpSpPr>
+      <p:grpSpPr>
+        <a:xfrm>
+          <a:off x="0" y="0"/>
+          <a:ext cx="0" cy="0"/>
+          <a:chOff x="0" y="0"/>
+          <a:chExt cx="0" cy="0"/>
+        </a:xfrm>
+      </p:grpSpPr>
+      <p:sp>
+        <p:nvSpPr>
+          <p:cNvPr id="2" name="Título 1"/>
+          <p:cNvSpPr>
+            <a:spLocks noGrp="1"/>
+          </p:cNvSpPr>
+          <p:nvPr>
+            <p:ph type="title"/>
+          </p:nvPr>
+        </p:nvSpPr>
+        <p:spPr/>
+        <p:txBody>
+          <a:bodyPr/>
+          <a:lstStyle/>
+          <a:p>
+            <a:r>
+              <a:rPr lang="es-ES" dirty="0"/>
+              <a:t>Tiendas de videojuegos online</a:t>
+            </a:r>
+          </a:p>
+        </p:txBody>
+      </p:sp>
+      <p:pic>
+        <p:nvPicPr>
+          <p:cNvPr id="4" name="Picture 6" descr="Resultado de imagen de steam"/>
+          <p:cNvPicPr>
+            <a:picLocks noGrp="1" noChangeAspect="1" noChangeArrowheads="1"/>
+          </p:cNvPicPr>
+          <p:nvPr>
+            <p:ph idx="1"/>
+          </p:nvPr>
+        </p:nvPicPr>
+        <p:blipFill>
+          <a:blip r:embed="rId2">
+            <a:extLst>
+              <a:ext uri="{28A0092B-C50C-407E-A947-70E740481C1C}">
+                <a14:useLocalDpi xmlns:a14="http://schemas.microsoft.com/office/drawing/2010/main" val="0"/>
+              </a:ext>
+            </a:extLst>
+          </a:blip>
+          <a:srcRect/>
+          <a:stretch>
+            <a:fillRect/>
+          </a:stretch>
+        </p:blipFill>
+        <p:spPr bwMode="auto">
+          <a:xfrm>
+            <a:off x="614238" y="2882741"/>
+            <a:ext cx="2357743" cy="2357743"/>
+          </a:xfrm>
+          <a:prstGeom prst="rect">
+            <a:avLst/>
+          </a:prstGeom>
+          <a:noFill/>
+          <a:extLst>
+            <a:ext uri="{909E8E84-426E-40DD-AFC4-6F175D3DCCD1}">
+              <a14:hiddenFill xmlns:a14="http://schemas.microsoft.com/office/drawing/2010/main">
+                <a:solidFill>
+                  <a:srgbClr val="FFFFFF"/>
+                </a:solidFill>
+              </a14:hiddenFill>
+            </a:ext>
+          </a:extLst>
+        </p:spPr>
+      </p:pic>
+      <p:pic>
+        <p:nvPicPr>
+          <p:cNvPr id="4098" name="Picture 2" descr="Resultado de imagen de PLaystation store"/>
+          <p:cNvPicPr>
+            <a:picLocks noChangeAspect="1" noChangeArrowheads="1"/>
+          </p:cNvPicPr>
+          <p:nvPr/>
+        </p:nvPicPr>
+        <p:blipFill>
+          <a:blip r:embed="rId3">
+            <a:extLst>
+              <a:ext uri="{28A0092B-C50C-407E-A947-70E740481C1C}">
+                <a14:useLocalDpi xmlns:a14="http://schemas.microsoft.com/office/drawing/2010/main" val="0"/>
+              </a:ext>
+            </a:extLst>
+          </a:blip>
+          <a:srcRect/>
+          <a:stretch>
+            <a:fillRect/>
+          </a:stretch>
+        </p:blipFill>
+        <p:spPr bwMode="auto">
+          <a:xfrm>
+            <a:off x="3368356" y="3513924"/>
+            <a:ext cx="5202067" cy="1095375"/>
+          </a:xfrm>
+          <a:prstGeom prst="rect">
+            <a:avLst/>
+          </a:prstGeom>
+          <a:solidFill>
+            <a:schemeClr val="tx1"/>
+          </a:solidFill>
+        </p:spPr>
+      </p:pic>
+      <p:pic>
+        <p:nvPicPr>
+          <p:cNvPr id="4100" name="Picture 4" descr="Resultado de imagen de xbox store"/>
+          <p:cNvPicPr>
+            <a:picLocks noChangeAspect="1" noChangeArrowheads="1"/>
+          </p:cNvPicPr>
+          <p:nvPr/>
+        </p:nvPicPr>
+        <p:blipFill>
+          <a:blip r:embed="rId4">
+            <a:extLst>
+              <a:ext uri="{28A0092B-C50C-407E-A947-70E740481C1C}">
+                <a14:useLocalDpi xmlns:a14="http://schemas.microsoft.com/office/drawing/2010/main" val="0"/>
+              </a:ext>
+            </a:extLst>
+          </a:blip>
+          <a:srcRect/>
+          <a:stretch>
+            <a:fillRect/>
+          </a:stretch>
+        </p:blipFill>
+        <p:spPr bwMode="auto">
+          <a:xfrm>
+            <a:off x="9085112" y="2943598"/>
+            <a:ext cx="2296886" cy="2296886"/>
+          </a:xfrm>
+          <a:prstGeom prst="rect">
+            <a:avLst/>
+          </a:prstGeom>
+          <a:noFill/>
+          <a:extLst>
+            <a:ext uri="{909E8E84-426E-40DD-AFC4-6F175D3DCCD1}">
+              <a14:hiddenFill xmlns:a14="http://schemas.microsoft.com/office/drawing/2010/main">
+                <a:solidFill>
+                  <a:srgbClr val="FFFFFF"/>
+                </a:solidFill>
+              </a14:hiddenFill>
+            </a:ext>
+          </a:extLst>
+        </p:spPr>
+      </p:pic>
+    </p:spTree>
+    <p:extLst>
+      <p:ext uri="{BB962C8B-B14F-4D97-AF65-F5344CB8AC3E}">
+        <p14:creationId xmlns:p14="http://schemas.microsoft.com/office/powerpoint/2010/main" val="4058546802"/>
+      </p:ext>
+    </p:extLst>
+  </p:cSld>
+  <p:clrMapOvr>
+    <a:masterClrMapping/>
+  </p:clrMapOvr>
+</p:sld>
+</file>
+
+<file path=ppt/slides/slide9.xml><?xml version="1.0" encoding="utf-8"?>
+<p:sld xmlns:a="http://schemas.openxmlformats.org/drawingml/2006/main" xmlns:r="http://schemas.openxmlformats.org/officeDocument/2006/relationships" xmlns:p="http://schemas.openxmlformats.org/presentationml/2006/main">
+  <p:cSld>
+    <p:spTree>
+      <p:nvGrpSpPr>
+        <p:cNvPr id="1" name=""/>
+        <p:cNvGrpSpPr/>
+        <p:nvPr/>
+      </p:nvGrpSpPr>
+      <p:grpSpPr>
+        <a:xfrm>
+          <a:off x="0" y="0"/>
+          <a:ext cx="0" cy="0"/>
+          <a:chOff x="0" y="0"/>
+          <a:chExt cx="0" cy="0"/>
+        </a:xfrm>
+      </p:grpSpPr>
+      <p:sp>
+        <p:nvSpPr>
+          <p:cNvPr id="2" name="Título 1"/>
+          <p:cNvSpPr>
+            <a:spLocks noGrp="1"/>
+          </p:cNvSpPr>
+          <p:nvPr>
+            <p:ph type="title"/>
+          </p:nvPr>
+        </p:nvSpPr>
+        <p:spPr/>
+        <p:txBody>
+          <a:bodyPr/>
+          <a:lstStyle/>
+          <a:p>
+            <a:r>
+              <a:rPr lang="es-ES" dirty="0"/>
+              <a:t>Tienda de aplicaciones para Smart TV</a:t>
+            </a:r>
+          </a:p>
+        </p:txBody>
+      </p:sp>
+      <p:pic>
+        <p:nvPicPr>
+          <p:cNvPr id="5122" name="Picture 2" descr="Resultado de imagen de google play tv"/>
+          <p:cNvPicPr>
+            <a:picLocks noGrp="1" noChangeAspect="1" noChangeArrowheads="1"/>
+          </p:cNvPicPr>
+          <p:nvPr>
+            <p:ph idx="1"/>
+          </p:nvPr>
+        </p:nvPicPr>
+        <p:blipFill>
+          <a:blip r:embed="rId2">
+            <a:extLst>
+              <a:ext uri="{28A0092B-C50C-407E-A947-70E740481C1C}">
+                <a14:useLocalDpi xmlns:a14="http://schemas.microsoft.com/office/drawing/2010/main" val="0"/>
+              </a:ext>
+            </a:extLst>
+          </a:blip>
+          <a:srcRect/>
+          <a:stretch>
+            <a:fillRect/>
+          </a:stretch>
+        </p:blipFill>
+        <p:spPr bwMode="auto">
+          <a:xfrm>
+            <a:off x="1111348" y="2786341"/>
+            <a:ext cx="3984874" cy="2749564"/>
+          </a:xfrm>
+          <a:prstGeom prst="rect">
+            <a:avLst/>
+          </a:prstGeom>
+          <a:noFill/>
+          <a:extLst>
+            <a:ext uri="{909E8E84-426E-40DD-AFC4-6F175D3DCCD1}">
+              <a14:hiddenFill xmlns:a14="http://schemas.microsoft.com/office/drawing/2010/main">
+                <a:solidFill>
+                  <a:srgbClr val="FFFFFF"/>
+                </a:solidFill>
+              </a14:hiddenFill>
+            </a:ext>
+          </a:extLst>
+        </p:spPr>
+      </p:pic>
+      <p:pic>
+        <p:nvPicPr>
+          <p:cNvPr id="5124" name="Picture 4" descr="Resultado de imagen de samsung apps smart tv"/>
+          <p:cNvPicPr>
+            <a:picLocks noChangeAspect="1" noChangeArrowheads="1"/>
+          </p:cNvPicPr>
+          <p:nvPr/>
+        </p:nvPicPr>
+        <p:blipFill>
+          <a:blip r:embed="rId3">
+            <a:extLst>
+              <a:ext uri="{28A0092B-C50C-407E-A947-70E740481C1C}">
+                <a14:useLocalDpi xmlns:a14="http://schemas.microsoft.com/office/drawing/2010/main" val="0"/>
+              </a:ext>
+            </a:extLst>
+          </a:blip>
+          <a:srcRect/>
+          <a:stretch>
+            <a:fillRect/>
+          </a:stretch>
+        </p:blipFill>
+        <p:spPr bwMode="auto">
+          <a:xfrm>
+            <a:off x="5401738" y="2786341"/>
+            <a:ext cx="5509662" cy="2785784"/>
+          </a:xfrm>
+          <a:prstGeom prst="rect">
+            <a:avLst/>
+          </a:prstGeom>
+          <a:noFill/>
+          <a:extLst>
+            <a:ext uri="{909E8E84-426E-40DD-AFC4-6F175D3DCCD1}">
+              <a14:hiddenFill xmlns:a14="http://schemas.microsoft.com/office/drawing/2010/main">
+                <a:solidFill>
+                  <a:srgbClr val="FFFFFF"/>
+                </a:solidFill>
+              </a14:hiddenFill>
+            </a:ext>
+          </a:extLst>
+        </p:spPr>
+      </p:pic>
+    </p:spTree>
+    <p:extLst>
+      <p:ext uri="{BB962C8B-B14F-4D97-AF65-F5344CB8AC3E}">
+        <p14:creationId xmlns:p14="http://schemas.microsoft.com/office/powerpoint/2010/main" val="1546614508"/>
       </p:ext>
     </p:extLst>
   </p:cSld>

</xml_diff>

<commit_message>
He añadido más diapositivas
</commit_message>
<xml_diff>
--- a/PM-TEMA 8 v1.pptx
+++ b/PM-TEMA 8 v1.pptx
@@ -12,9 +12,17 @@
     <p:sldId id="262" r:id="rId6"/>
     <p:sldId id="263" r:id="rId7"/>
     <p:sldId id="264" r:id="rId8"/>
-    <p:sldId id="265" r:id="rId9"/>
-    <p:sldId id="266" r:id="rId10"/>
-    <p:sldId id="267" r:id="rId11"/>
+    <p:sldId id="268" r:id="rId9"/>
+    <p:sldId id="269" r:id="rId10"/>
+    <p:sldId id="270" r:id="rId11"/>
+    <p:sldId id="271" r:id="rId12"/>
+    <p:sldId id="265" r:id="rId13"/>
+    <p:sldId id="272" r:id="rId14"/>
+    <p:sldId id="273" r:id="rId15"/>
+    <p:sldId id="274" r:id="rId16"/>
+    <p:sldId id="266" r:id="rId17"/>
+    <p:sldId id="275" r:id="rId18"/>
+    <p:sldId id="267" r:id="rId19"/>
   </p:sldIdLst>
   <p:sldSz cx="12192000" cy="6858000"/>
   <p:notesSz cx="6858000" cy="9144000"/>
@@ -11088,6 +11096,816 @@
           <a:p>
             <a:r>
               <a:rPr lang="es-ES" dirty="0"/>
+              <a:t>Google Play</a:t>
+            </a:r>
+          </a:p>
+        </p:txBody>
+      </p:sp>
+      <p:pic>
+        <p:nvPicPr>
+          <p:cNvPr id="4" name="Marcador de contenido 3"/>
+          <p:cNvPicPr>
+            <a:picLocks noGrp="1" noChangeAspect="1"/>
+          </p:cNvPicPr>
+          <p:nvPr>
+            <p:ph idx="1"/>
+          </p:nvPr>
+        </p:nvPicPr>
+        <p:blipFill>
+          <a:blip r:embed="rId2"/>
+          <a:stretch>
+            <a:fillRect/>
+          </a:stretch>
+        </p:blipFill>
+        <p:spPr>
+          <a:xfrm>
+            <a:off x="599855" y="3016521"/>
+            <a:ext cx="3029975" cy="2274005"/>
+          </a:xfrm>
+          <a:prstGeom prst="rect">
+            <a:avLst/>
+          </a:prstGeom>
+        </p:spPr>
+      </p:pic>
+    </p:spTree>
+    <p:extLst>
+      <p:ext uri="{BB962C8B-B14F-4D97-AF65-F5344CB8AC3E}">
+        <p14:creationId xmlns:p14="http://schemas.microsoft.com/office/powerpoint/2010/main" val="2474350017"/>
+      </p:ext>
+    </p:extLst>
+  </p:cSld>
+  <p:clrMapOvr>
+    <a:masterClrMapping/>
+  </p:clrMapOvr>
+</p:sld>
+</file>
+
+<file path=ppt/slides/slide11.xml><?xml version="1.0" encoding="utf-8"?>
+<p:sld xmlns:a="http://schemas.openxmlformats.org/drawingml/2006/main" xmlns:r="http://schemas.openxmlformats.org/officeDocument/2006/relationships" xmlns:p="http://schemas.openxmlformats.org/presentationml/2006/main">
+  <p:cSld>
+    <p:spTree>
+      <p:nvGrpSpPr>
+        <p:cNvPr id="1" name=""/>
+        <p:cNvGrpSpPr/>
+        <p:nvPr/>
+      </p:nvGrpSpPr>
+      <p:grpSpPr>
+        <a:xfrm>
+          <a:off x="0" y="0"/>
+          <a:ext cx="0" cy="0"/>
+          <a:chOff x="0" y="0"/>
+          <a:chExt cx="0" cy="0"/>
+        </a:xfrm>
+      </p:grpSpPr>
+      <p:sp>
+        <p:nvSpPr>
+          <p:cNvPr id="2" name="Título 1"/>
+          <p:cNvSpPr>
+            <a:spLocks noGrp="1"/>
+          </p:cNvSpPr>
+          <p:nvPr>
+            <p:ph type="title"/>
+          </p:nvPr>
+        </p:nvSpPr>
+        <p:spPr/>
+        <p:txBody>
+          <a:bodyPr/>
+          <a:lstStyle/>
+          <a:p>
+            <a:r>
+              <a:rPr lang="es-ES" dirty="0"/>
+              <a:t>Windows </a:t>
+            </a:r>
+            <a:r>
+              <a:rPr lang="es-ES" dirty="0" err="1"/>
+              <a:t>Phone</a:t>
+            </a:r>
+            <a:endParaRPr lang="es-ES" dirty="0"/>
+          </a:p>
+        </p:txBody>
+      </p:sp>
+      <p:pic>
+        <p:nvPicPr>
+          <p:cNvPr id="4" name="Picture 2" descr="Resultado de imagen de windows store"/>
+          <p:cNvPicPr>
+            <a:picLocks noGrp="1" noChangeAspect="1" noChangeArrowheads="1"/>
+          </p:cNvPicPr>
+          <p:nvPr>
+            <p:ph idx="1"/>
+          </p:nvPr>
+        </p:nvPicPr>
+        <p:blipFill rotWithShape="1">
+          <a:blip r:embed="rId2">
+            <a:extLst>
+              <a:ext uri="{28A0092B-C50C-407E-A947-70E740481C1C}">
+                <a14:useLocalDpi xmlns:a14="http://schemas.microsoft.com/office/drawing/2010/main" val="0"/>
+              </a:ext>
+            </a:extLst>
+          </a:blip>
+          <a:srcRect l="20670" t="4136" r="21223" b="3341"/>
+          <a:stretch/>
+        </p:blipFill>
+        <p:spPr bwMode="auto">
+          <a:xfrm>
+            <a:off x="1007164" y="3485321"/>
+            <a:ext cx="2773171" cy="1947631"/>
+          </a:xfrm>
+          <a:prstGeom prst="rect">
+            <a:avLst/>
+          </a:prstGeom>
+          <a:noFill/>
+          <a:extLst>
+            <a:ext uri="{909E8E84-426E-40DD-AFC4-6F175D3DCCD1}">
+              <a14:hiddenFill xmlns:a14="http://schemas.microsoft.com/office/drawing/2010/main">
+                <a:solidFill>
+                  <a:srgbClr val="FFFFFF"/>
+                </a:solidFill>
+              </a14:hiddenFill>
+            </a:ext>
+          </a:extLst>
+        </p:spPr>
+      </p:pic>
+    </p:spTree>
+    <p:extLst>
+      <p:ext uri="{BB962C8B-B14F-4D97-AF65-F5344CB8AC3E}">
+        <p14:creationId xmlns:p14="http://schemas.microsoft.com/office/powerpoint/2010/main" val="3594357224"/>
+      </p:ext>
+    </p:extLst>
+  </p:cSld>
+  <p:clrMapOvr>
+    <a:masterClrMapping/>
+  </p:clrMapOvr>
+</p:sld>
+</file>
+
+<file path=ppt/slides/slide12.xml><?xml version="1.0" encoding="utf-8"?>
+<p:sld xmlns:a="http://schemas.openxmlformats.org/drawingml/2006/main" xmlns:r="http://schemas.openxmlformats.org/officeDocument/2006/relationships" xmlns:p="http://schemas.openxmlformats.org/presentationml/2006/main">
+  <p:cSld>
+    <p:spTree>
+      <p:nvGrpSpPr>
+        <p:cNvPr id="1" name=""/>
+        <p:cNvGrpSpPr/>
+        <p:nvPr/>
+      </p:nvGrpSpPr>
+      <p:grpSpPr>
+        <a:xfrm>
+          <a:off x="0" y="0"/>
+          <a:ext cx="0" cy="0"/>
+          <a:chOff x="0" y="0"/>
+          <a:chExt cx="0" cy="0"/>
+        </a:xfrm>
+      </p:grpSpPr>
+      <p:sp>
+        <p:nvSpPr>
+          <p:cNvPr id="2" name="Título 1"/>
+          <p:cNvSpPr>
+            <a:spLocks noGrp="1"/>
+          </p:cNvSpPr>
+          <p:nvPr>
+            <p:ph type="title"/>
+          </p:nvPr>
+        </p:nvSpPr>
+        <p:spPr/>
+        <p:txBody>
+          <a:bodyPr/>
+          <a:lstStyle/>
+          <a:p>
+            <a:r>
+              <a:rPr lang="es-ES" dirty="0"/>
+              <a:t>Tiendas de videojuegos online</a:t>
+            </a:r>
+          </a:p>
+        </p:txBody>
+      </p:sp>
+      <p:pic>
+        <p:nvPicPr>
+          <p:cNvPr id="4" name="Picture 6" descr="Resultado de imagen de steam"/>
+          <p:cNvPicPr>
+            <a:picLocks noGrp="1" noChangeAspect="1" noChangeArrowheads="1"/>
+          </p:cNvPicPr>
+          <p:nvPr>
+            <p:ph idx="1"/>
+          </p:nvPr>
+        </p:nvPicPr>
+        <p:blipFill>
+          <a:blip r:embed="rId2">
+            <a:extLst>
+              <a:ext uri="{28A0092B-C50C-407E-A947-70E740481C1C}">
+                <a14:useLocalDpi xmlns:a14="http://schemas.microsoft.com/office/drawing/2010/main" val="0"/>
+              </a:ext>
+            </a:extLst>
+          </a:blip>
+          <a:srcRect/>
+          <a:stretch>
+            <a:fillRect/>
+          </a:stretch>
+        </p:blipFill>
+        <p:spPr bwMode="auto">
+          <a:xfrm>
+            <a:off x="614238" y="2882741"/>
+            <a:ext cx="2357743" cy="2357743"/>
+          </a:xfrm>
+          <a:prstGeom prst="rect">
+            <a:avLst/>
+          </a:prstGeom>
+          <a:noFill/>
+          <a:extLst>
+            <a:ext uri="{909E8E84-426E-40DD-AFC4-6F175D3DCCD1}">
+              <a14:hiddenFill xmlns:a14="http://schemas.microsoft.com/office/drawing/2010/main">
+                <a:solidFill>
+                  <a:srgbClr val="FFFFFF"/>
+                </a:solidFill>
+              </a14:hiddenFill>
+            </a:ext>
+          </a:extLst>
+        </p:spPr>
+      </p:pic>
+      <p:pic>
+        <p:nvPicPr>
+          <p:cNvPr id="4098" name="Picture 2" descr="Resultado de imagen de PLaystation store"/>
+          <p:cNvPicPr>
+            <a:picLocks noChangeAspect="1" noChangeArrowheads="1"/>
+          </p:cNvPicPr>
+          <p:nvPr/>
+        </p:nvPicPr>
+        <p:blipFill>
+          <a:blip r:embed="rId3">
+            <a:extLst>
+              <a:ext uri="{28A0092B-C50C-407E-A947-70E740481C1C}">
+                <a14:useLocalDpi xmlns:a14="http://schemas.microsoft.com/office/drawing/2010/main" val="0"/>
+              </a:ext>
+            </a:extLst>
+          </a:blip>
+          <a:srcRect/>
+          <a:stretch>
+            <a:fillRect/>
+          </a:stretch>
+        </p:blipFill>
+        <p:spPr bwMode="auto">
+          <a:xfrm>
+            <a:off x="3368356" y="3513924"/>
+            <a:ext cx="5202067" cy="1095375"/>
+          </a:xfrm>
+          <a:prstGeom prst="rect">
+            <a:avLst/>
+          </a:prstGeom>
+          <a:solidFill>
+            <a:schemeClr val="tx1"/>
+          </a:solidFill>
+        </p:spPr>
+      </p:pic>
+      <p:pic>
+        <p:nvPicPr>
+          <p:cNvPr id="4100" name="Picture 4" descr="Resultado de imagen de xbox store"/>
+          <p:cNvPicPr>
+            <a:picLocks noChangeAspect="1" noChangeArrowheads="1"/>
+          </p:cNvPicPr>
+          <p:nvPr/>
+        </p:nvPicPr>
+        <p:blipFill>
+          <a:blip r:embed="rId4">
+            <a:extLst>
+              <a:ext uri="{28A0092B-C50C-407E-A947-70E740481C1C}">
+                <a14:useLocalDpi xmlns:a14="http://schemas.microsoft.com/office/drawing/2010/main" val="0"/>
+              </a:ext>
+            </a:extLst>
+          </a:blip>
+          <a:srcRect/>
+          <a:stretch>
+            <a:fillRect/>
+          </a:stretch>
+        </p:blipFill>
+        <p:spPr bwMode="auto">
+          <a:xfrm>
+            <a:off x="9085112" y="2943598"/>
+            <a:ext cx="2296886" cy="2296886"/>
+          </a:xfrm>
+          <a:prstGeom prst="rect">
+            <a:avLst/>
+          </a:prstGeom>
+          <a:noFill/>
+          <a:extLst>
+            <a:ext uri="{909E8E84-426E-40DD-AFC4-6F175D3DCCD1}">
+              <a14:hiddenFill xmlns:a14="http://schemas.microsoft.com/office/drawing/2010/main">
+                <a:solidFill>
+                  <a:srgbClr val="FFFFFF"/>
+                </a:solidFill>
+              </a14:hiddenFill>
+            </a:ext>
+          </a:extLst>
+        </p:spPr>
+      </p:pic>
+    </p:spTree>
+    <p:extLst>
+      <p:ext uri="{BB962C8B-B14F-4D97-AF65-F5344CB8AC3E}">
+        <p14:creationId xmlns:p14="http://schemas.microsoft.com/office/powerpoint/2010/main" val="4058546802"/>
+      </p:ext>
+    </p:extLst>
+  </p:cSld>
+  <p:clrMapOvr>
+    <a:masterClrMapping/>
+  </p:clrMapOvr>
+</p:sld>
+</file>
+
+<file path=ppt/slides/slide13.xml><?xml version="1.0" encoding="utf-8"?>
+<p:sld xmlns:a="http://schemas.openxmlformats.org/drawingml/2006/main" xmlns:r="http://schemas.openxmlformats.org/officeDocument/2006/relationships" xmlns:p="http://schemas.openxmlformats.org/presentationml/2006/main">
+  <p:cSld>
+    <p:spTree>
+      <p:nvGrpSpPr>
+        <p:cNvPr id="1" name=""/>
+        <p:cNvGrpSpPr/>
+        <p:nvPr/>
+      </p:nvGrpSpPr>
+      <p:grpSpPr>
+        <a:xfrm>
+          <a:off x="0" y="0"/>
+          <a:ext cx="0" cy="0"/>
+          <a:chOff x="0" y="0"/>
+          <a:chExt cx="0" cy="0"/>
+        </a:xfrm>
+      </p:grpSpPr>
+      <p:sp>
+        <p:nvSpPr>
+          <p:cNvPr id="2" name="Título 1"/>
+          <p:cNvSpPr>
+            <a:spLocks noGrp="1"/>
+          </p:cNvSpPr>
+          <p:nvPr>
+            <p:ph type="title"/>
+          </p:nvPr>
+        </p:nvSpPr>
+        <p:spPr/>
+        <p:txBody>
+          <a:bodyPr/>
+          <a:lstStyle/>
+          <a:p>
+            <a:r>
+              <a:rPr lang="es-ES" dirty="0" err="1"/>
+              <a:t>Steam</a:t>
+            </a:r>
+            <a:endParaRPr lang="es-ES" dirty="0"/>
+          </a:p>
+        </p:txBody>
+      </p:sp>
+      <p:pic>
+        <p:nvPicPr>
+          <p:cNvPr id="4" name="Marcador de contenido 3"/>
+          <p:cNvPicPr>
+            <a:picLocks noGrp="1" noChangeAspect="1"/>
+          </p:cNvPicPr>
+          <p:nvPr>
+            <p:ph idx="1"/>
+          </p:nvPr>
+        </p:nvPicPr>
+        <p:blipFill>
+          <a:blip r:embed="rId2"/>
+          <a:stretch>
+            <a:fillRect/>
+          </a:stretch>
+        </p:blipFill>
+        <p:spPr>
+          <a:xfrm>
+            <a:off x="598942" y="3073720"/>
+            <a:ext cx="2469094" cy="2469094"/>
+          </a:xfrm>
+          <a:prstGeom prst="rect">
+            <a:avLst/>
+          </a:prstGeom>
+        </p:spPr>
+      </p:pic>
+    </p:spTree>
+    <p:extLst>
+      <p:ext uri="{BB962C8B-B14F-4D97-AF65-F5344CB8AC3E}">
+        <p14:creationId xmlns:p14="http://schemas.microsoft.com/office/powerpoint/2010/main" val="3918270593"/>
+      </p:ext>
+    </p:extLst>
+  </p:cSld>
+  <p:clrMapOvr>
+    <a:masterClrMapping/>
+  </p:clrMapOvr>
+</p:sld>
+</file>
+
+<file path=ppt/slides/slide14.xml><?xml version="1.0" encoding="utf-8"?>
+<p:sld xmlns:a="http://schemas.openxmlformats.org/drawingml/2006/main" xmlns:r="http://schemas.openxmlformats.org/officeDocument/2006/relationships" xmlns:p="http://schemas.openxmlformats.org/presentationml/2006/main">
+  <p:cSld>
+    <p:spTree>
+      <p:nvGrpSpPr>
+        <p:cNvPr id="1" name=""/>
+        <p:cNvGrpSpPr/>
+        <p:nvPr/>
+      </p:nvGrpSpPr>
+      <p:grpSpPr>
+        <a:xfrm>
+          <a:off x="0" y="0"/>
+          <a:ext cx="0" cy="0"/>
+          <a:chOff x="0" y="0"/>
+          <a:chExt cx="0" cy="0"/>
+        </a:xfrm>
+      </p:grpSpPr>
+      <p:sp>
+        <p:nvSpPr>
+          <p:cNvPr id="2" name="Título 1"/>
+          <p:cNvSpPr>
+            <a:spLocks noGrp="1"/>
+          </p:cNvSpPr>
+          <p:nvPr>
+            <p:ph type="title"/>
+          </p:nvPr>
+        </p:nvSpPr>
+        <p:spPr/>
+        <p:txBody>
+          <a:bodyPr/>
+          <a:lstStyle/>
+          <a:p>
+            <a:r>
+              <a:rPr lang="es-ES" dirty="0"/>
+              <a:t>Play </a:t>
+            </a:r>
+            <a:r>
+              <a:rPr lang="es-ES" dirty="0" err="1"/>
+              <a:t>Station</a:t>
+            </a:r>
+            <a:r>
+              <a:rPr lang="es-ES" dirty="0"/>
+              <a:t> Store</a:t>
+            </a:r>
+          </a:p>
+        </p:txBody>
+      </p:sp>
+      <p:pic>
+        <p:nvPicPr>
+          <p:cNvPr id="4" name="Marcador de contenido 3"/>
+          <p:cNvPicPr>
+            <a:picLocks noGrp="1" noChangeAspect="1"/>
+          </p:cNvPicPr>
+          <p:nvPr>
+            <p:ph idx="1"/>
+          </p:nvPr>
+        </p:nvPicPr>
+        <p:blipFill>
+          <a:blip r:embed="rId2"/>
+          <a:stretch>
+            <a:fillRect/>
+          </a:stretch>
+        </p:blipFill>
+        <p:spPr>
+          <a:xfrm>
+            <a:off x="486443" y="3661107"/>
+            <a:ext cx="5200339" cy="1097375"/>
+          </a:xfrm>
+          <a:prstGeom prst="rect">
+            <a:avLst/>
+          </a:prstGeom>
+        </p:spPr>
+      </p:pic>
+    </p:spTree>
+    <p:extLst>
+      <p:ext uri="{BB962C8B-B14F-4D97-AF65-F5344CB8AC3E}">
+        <p14:creationId xmlns:p14="http://schemas.microsoft.com/office/powerpoint/2010/main" val="3330208478"/>
+      </p:ext>
+    </p:extLst>
+  </p:cSld>
+  <p:clrMapOvr>
+    <a:masterClrMapping/>
+  </p:clrMapOvr>
+</p:sld>
+</file>
+
+<file path=ppt/slides/slide15.xml><?xml version="1.0" encoding="utf-8"?>
+<p:sld xmlns:a="http://schemas.openxmlformats.org/drawingml/2006/main" xmlns:r="http://schemas.openxmlformats.org/officeDocument/2006/relationships" xmlns:p="http://schemas.openxmlformats.org/presentationml/2006/main">
+  <p:cSld>
+    <p:spTree>
+      <p:nvGrpSpPr>
+        <p:cNvPr id="1" name=""/>
+        <p:cNvGrpSpPr/>
+        <p:nvPr/>
+      </p:nvGrpSpPr>
+      <p:grpSpPr>
+        <a:xfrm>
+          <a:off x="0" y="0"/>
+          <a:ext cx="0" cy="0"/>
+          <a:chOff x="0" y="0"/>
+          <a:chExt cx="0" cy="0"/>
+        </a:xfrm>
+      </p:grpSpPr>
+      <p:sp>
+        <p:nvSpPr>
+          <p:cNvPr id="2" name="Título 1"/>
+          <p:cNvSpPr>
+            <a:spLocks noGrp="1"/>
+          </p:cNvSpPr>
+          <p:nvPr>
+            <p:ph type="title"/>
+          </p:nvPr>
+        </p:nvSpPr>
+        <p:spPr/>
+        <p:txBody>
+          <a:bodyPr/>
+          <a:lstStyle/>
+          <a:p>
+            <a:r>
+              <a:rPr lang="es-ES" dirty="0"/>
+              <a:t>Tienda Xbox</a:t>
+            </a:r>
+          </a:p>
+        </p:txBody>
+      </p:sp>
+      <p:pic>
+        <p:nvPicPr>
+          <p:cNvPr id="4" name="Picture 4" descr="Resultado de imagen de xbox store"/>
+          <p:cNvPicPr>
+            <a:picLocks noGrp="1" noChangeAspect="1" noChangeArrowheads="1"/>
+          </p:cNvPicPr>
+          <p:nvPr>
+            <p:ph idx="1"/>
+          </p:nvPr>
+        </p:nvPicPr>
+        <p:blipFill>
+          <a:blip r:embed="rId2">
+            <a:extLst>
+              <a:ext uri="{28A0092B-C50C-407E-A947-70E740481C1C}">
+                <a14:useLocalDpi xmlns:a14="http://schemas.microsoft.com/office/drawing/2010/main" val="0"/>
+              </a:ext>
+            </a:extLst>
+          </a:blip>
+          <a:srcRect/>
+          <a:stretch>
+            <a:fillRect/>
+          </a:stretch>
+        </p:blipFill>
+        <p:spPr bwMode="auto">
+          <a:xfrm>
+            <a:off x="810000" y="3221307"/>
+            <a:ext cx="2110349" cy="2110349"/>
+          </a:xfrm>
+          <a:prstGeom prst="rect">
+            <a:avLst/>
+          </a:prstGeom>
+          <a:noFill/>
+          <a:extLst>
+            <a:ext uri="{909E8E84-426E-40DD-AFC4-6F175D3DCCD1}">
+              <a14:hiddenFill xmlns:a14="http://schemas.microsoft.com/office/drawing/2010/main">
+                <a:solidFill>
+                  <a:srgbClr val="FFFFFF"/>
+                </a:solidFill>
+              </a14:hiddenFill>
+            </a:ext>
+          </a:extLst>
+        </p:spPr>
+      </p:pic>
+    </p:spTree>
+    <p:extLst>
+      <p:ext uri="{BB962C8B-B14F-4D97-AF65-F5344CB8AC3E}">
+        <p14:creationId xmlns:p14="http://schemas.microsoft.com/office/powerpoint/2010/main" val="3198938540"/>
+      </p:ext>
+    </p:extLst>
+  </p:cSld>
+  <p:clrMapOvr>
+    <a:masterClrMapping/>
+  </p:clrMapOvr>
+</p:sld>
+</file>
+
+<file path=ppt/slides/slide16.xml><?xml version="1.0" encoding="utf-8"?>
+<p:sld xmlns:a="http://schemas.openxmlformats.org/drawingml/2006/main" xmlns:r="http://schemas.openxmlformats.org/officeDocument/2006/relationships" xmlns:p="http://schemas.openxmlformats.org/presentationml/2006/main">
+  <p:cSld>
+    <p:spTree>
+      <p:nvGrpSpPr>
+        <p:cNvPr id="1" name=""/>
+        <p:cNvGrpSpPr/>
+        <p:nvPr/>
+      </p:nvGrpSpPr>
+      <p:grpSpPr>
+        <a:xfrm>
+          <a:off x="0" y="0"/>
+          <a:ext cx="0" cy="0"/>
+          <a:chOff x="0" y="0"/>
+          <a:chExt cx="0" cy="0"/>
+        </a:xfrm>
+      </p:grpSpPr>
+      <p:sp>
+        <p:nvSpPr>
+          <p:cNvPr id="2" name="Título 1"/>
+          <p:cNvSpPr>
+            <a:spLocks noGrp="1"/>
+          </p:cNvSpPr>
+          <p:nvPr>
+            <p:ph type="title"/>
+          </p:nvPr>
+        </p:nvSpPr>
+        <p:spPr/>
+        <p:txBody>
+          <a:bodyPr/>
+          <a:lstStyle/>
+          <a:p>
+            <a:r>
+              <a:rPr lang="es-ES" dirty="0"/>
+              <a:t>Tienda de aplicaciones para Smart TV</a:t>
+            </a:r>
+          </a:p>
+        </p:txBody>
+      </p:sp>
+      <p:pic>
+        <p:nvPicPr>
+          <p:cNvPr id="5122" name="Picture 2" descr="Resultado de imagen de google play tv"/>
+          <p:cNvPicPr>
+            <a:picLocks noGrp="1" noChangeAspect="1" noChangeArrowheads="1"/>
+          </p:cNvPicPr>
+          <p:nvPr>
+            <p:ph idx="1"/>
+          </p:nvPr>
+        </p:nvPicPr>
+        <p:blipFill>
+          <a:blip r:embed="rId2">
+            <a:extLst>
+              <a:ext uri="{28A0092B-C50C-407E-A947-70E740481C1C}">
+                <a14:useLocalDpi xmlns:a14="http://schemas.microsoft.com/office/drawing/2010/main" val="0"/>
+              </a:ext>
+            </a:extLst>
+          </a:blip>
+          <a:srcRect/>
+          <a:stretch>
+            <a:fillRect/>
+          </a:stretch>
+        </p:blipFill>
+        <p:spPr bwMode="auto">
+          <a:xfrm>
+            <a:off x="1111348" y="2786341"/>
+            <a:ext cx="3984874" cy="2749564"/>
+          </a:xfrm>
+          <a:prstGeom prst="rect">
+            <a:avLst/>
+          </a:prstGeom>
+          <a:noFill/>
+          <a:extLst>
+            <a:ext uri="{909E8E84-426E-40DD-AFC4-6F175D3DCCD1}">
+              <a14:hiddenFill xmlns:a14="http://schemas.microsoft.com/office/drawing/2010/main">
+                <a:solidFill>
+                  <a:srgbClr val="FFFFFF"/>
+                </a:solidFill>
+              </a14:hiddenFill>
+            </a:ext>
+          </a:extLst>
+        </p:spPr>
+      </p:pic>
+      <p:pic>
+        <p:nvPicPr>
+          <p:cNvPr id="5124" name="Picture 4" descr="Resultado de imagen de samsung apps smart tv"/>
+          <p:cNvPicPr>
+            <a:picLocks noChangeAspect="1" noChangeArrowheads="1"/>
+          </p:cNvPicPr>
+          <p:nvPr/>
+        </p:nvPicPr>
+        <p:blipFill>
+          <a:blip r:embed="rId3">
+            <a:extLst>
+              <a:ext uri="{28A0092B-C50C-407E-A947-70E740481C1C}">
+                <a14:useLocalDpi xmlns:a14="http://schemas.microsoft.com/office/drawing/2010/main" val="0"/>
+              </a:ext>
+            </a:extLst>
+          </a:blip>
+          <a:srcRect/>
+          <a:stretch>
+            <a:fillRect/>
+          </a:stretch>
+        </p:blipFill>
+        <p:spPr bwMode="auto">
+          <a:xfrm>
+            <a:off x="5401738" y="2786341"/>
+            <a:ext cx="5509662" cy="2785784"/>
+          </a:xfrm>
+          <a:prstGeom prst="rect">
+            <a:avLst/>
+          </a:prstGeom>
+          <a:noFill/>
+          <a:extLst>
+            <a:ext uri="{909E8E84-426E-40DD-AFC4-6F175D3DCCD1}">
+              <a14:hiddenFill xmlns:a14="http://schemas.microsoft.com/office/drawing/2010/main">
+                <a:solidFill>
+                  <a:srgbClr val="FFFFFF"/>
+                </a:solidFill>
+              </a14:hiddenFill>
+            </a:ext>
+          </a:extLst>
+        </p:spPr>
+      </p:pic>
+    </p:spTree>
+    <p:extLst>
+      <p:ext uri="{BB962C8B-B14F-4D97-AF65-F5344CB8AC3E}">
+        <p14:creationId xmlns:p14="http://schemas.microsoft.com/office/powerpoint/2010/main" val="1546614508"/>
+      </p:ext>
+    </p:extLst>
+  </p:cSld>
+  <p:clrMapOvr>
+    <a:masterClrMapping/>
+  </p:clrMapOvr>
+</p:sld>
+</file>
+
+<file path=ppt/slides/slide17.xml><?xml version="1.0" encoding="utf-8"?>
+<p:sld xmlns:a="http://schemas.openxmlformats.org/drawingml/2006/main" xmlns:r="http://schemas.openxmlformats.org/officeDocument/2006/relationships" xmlns:p="http://schemas.openxmlformats.org/presentationml/2006/main">
+  <p:cSld>
+    <p:spTree>
+      <p:nvGrpSpPr>
+        <p:cNvPr id="1" name=""/>
+        <p:cNvGrpSpPr/>
+        <p:nvPr/>
+      </p:nvGrpSpPr>
+      <p:grpSpPr>
+        <a:xfrm>
+          <a:off x="0" y="0"/>
+          <a:ext cx="0" cy="0"/>
+          <a:chOff x="0" y="0"/>
+          <a:chExt cx="0" cy="0"/>
+        </a:xfrm>
+      </p:grpSpPr>
+      <p:sp>
+        <p:nvSpPr>
+          <p:cNvPr id="2" name="Título 1"/>
+          <p:cNvSpPr>
+            <a:spLocks noGrp="1"/>
+          </p:cNvSpPr>
+          <p:nvPr>
+            <p:ph type="title"/>
+          </p:nvPr>
+        </p:nvSpPr>
+        <p:spPr/>
+        <p:txBody>
+          <a:bodyPr/>
+          <a:lstStyle/>
+          <a:p>
+            <a:endParaRPr lang="es-ES"/>
+          </a:p>
+        </p:txBody>
+      </p:sp>
+      <p:sp>
+        <p:nvSpPr>
+          <p:cNvPr id="3" name="Marcador de contenido 2"/>
+          <p:cNvSpPr>
+            <a:spLocks noGrp="1"/>
+          </p:cNvSpPr>
+          <p:nvPr>
+            <p:ph idx="1"/>
+          </p:nvPr>
+        </p:nvSpPr>
+        <p:spPr/>
+        <p:txBody>
+          <a:bodyPr/>
+          <a:lstStyle/>
+          <a:p>
+            <a:endParaRPr lang="es-ES"/>
+          </a:p>
+        </p:txBody>
+      </p:sp>
+    </p:spTree>
+    <p:extLst>
+      <p:ext uri="{BB962C8B-B14F-4D97-AF65-F5344CB8AC3E}">
+        <p14:creationId xmlns:p14="http://schemas.microsoft.com/office/powerpoint/2010/main" val="2235361935"/>
+      </p:ext>
+    </p:extLst>
+  </p:cSld>
+  <p:clrMapOvr>
+    <a:masterClrMapping/>
+  </p:clrMapOvr>
+</p:sld>
+</file>
+
+<file path=ppt/slides/slide18.xml><?xml version="1.0" encoding="utf-8"?>
+<p:sld xmlns:a="http://schemas.openxmlformats.org/drawingml/2006/main" xmlns:r="http://schemas.openxmlformats.org/officeDocument/2006/relationships" xmlns:p="http://schemas.openxmlformats.org/presentationml/2006/main">
+  <p:cSld>
+    <p:spTree>
+      <p:nvGrpSpPr>
+        <p:cNvPr id="1" name=""/>
+        <p:cNvGrpSpPr/>
+        <p:nvPr/>
+      </p:nvGrpSpPr>
+      <p:grpSpPr>
+        <a:xfrm>
+          <a:off x="0" y="0"/>
+          <a:ext cx="0" cy="0"/>
+          <a:chOff x="0" y="0"/>
+          <a:chExt cx="0" cy="0"/>
+        </a:xfrm>
+      </p:grpSpPr>
+      <p:sp>
+        <p:nvSpPr>
+          <p:cNvPr id="2" name="Título 1"/>
+          <p:cNvSpPr>
+            <a:spLocks noGrp="1"/>
+          </p:cNvSpPr>
+          <p:nvPr>
+            <p:ph type="title"/>
+          </p:nvPr>
+        </p:nvSpPr>
+        <p:spPr/>
+        <p:txBody>
+          <a:bodyPr/>
+          <a:lstStyle/>
+          <a:p>
+            <a:r>
+              <a:rPr lang="es-ES" dirty="0"/>
               <a:t>Tienda de aplicaciones para PC</a:t>
             </a:r>
           </a:p>
@@ -11759,40 +12577,14 @@
       </p:sp>
       <p:pic>
         <p:nvPicPr>
-          <p:cNvPr id="4" name="Marcador de contenido 3"/>
-          <p:cNvPicPr>
-            <a:picLocks noGrp="1" noChangeAspect="1"/>
-          </p:cNvPicPr>
-          <p:nvPr>
-            <p:ph idx="1"/>
-          </p:nvPr>
-        </p:nvPicPr>
-        <p:blipFill>
-          <a:blip r:embed="rId2"/>
-          <a:stretch>
-            <a:fillRect/>
-          </a:stretch>
-        </p:blipFill>
-        <p:spPr>
-          <a:xfrm>
-            <a:off x="810000" y="2615321"/>
-            <a:ext cx="2301472" cy="2301472"/>
-          </a:xfrm>
-          <a:prstGeom prst="rect">
-            <a:avLst/>
-          </a:prstGeom>
-        </p:spPr>
-      </p:pic>
-      <p:pic>
-        <p:nvPicPr>
-          <p:cNvPr id="2052" name="Picture 4" descr="Resultado de imagen de google play"/>
+          <p:cNvPr id="2058" name="Picture 10" descr="Resultado de imagen de tienda de software"/>
           <p:cNvPicPr>
             <a:picLocks noChangeAspect="1" noChangeArrowheads="1"/>
           </p:cNvPicPr>
           <p:nvPr/>
         </p:nvPicPr>
         <p:blipFill>
-          <a:blip r:embed="rId3">
+          <a:blip r:embed="rId2">
             <a:extLst>
               <a:ext uri="{28A0092B-C50C-407E-A947-70E740481C1C}">
                 <a14:useLocalDpi xmlns:a14="http://schemas.microsoft.com/office/drawing/2010/main" val="0"/>
@@ -11806,49 +12598,8 @@
         </p:blipFill>
         <p:spPr bwMode="auto">
           <a:xfrm>
-            <a:off x="4009293" y="2545117"/>
-            <a:ext cx="3255840" cy="2441880"/>
-          </a:xfrm>
-          <a:prstGeom prst="rect">
-            <a:avLst/>
-          </a:prstGeom>
-          <a:noFill/>
-          <a:extLst>
-            <a:ext uri="{909E8E84-426E-40DD-AFC4-6F175D3DCCD1}">
-              <a14:hiddenFill xmlns:a14="http://schemas.microsoft.com/office/drawing/2010/main">
-                <a:solidFill>
-                  <a:srgbClr val="FFFFFF"/>
-                </a:solidFill>
-              </a14:hiddenFill>
-            </a:ext>
-          </a:extLst>
-        </p:spPr>
-      </p:pic>
-      <p:pic>
-        <p:nvPicPr>
-          <p:cNvPr id="2054" name="Picture 6" descr="Resultado de imagen de steam"/>
-          <p:cNvPicPr>
-            <a:picLocks noChangeAspect="1" noChangeArrowheads="1"/>
-          </p:cNvPicPr>
-          <p:nvPr/>
-        </p:nvPicPr>
-        <p:blipFill>
-          <a:blip r:embed="rId4">
-            <a:extLst>
-              <a:ext uri="{28A0092B-C50C-407E-A947-70E740481C1C}">
-                <a14:useLocalDpi xmlns:a14="http://schemas.microsoft.com/office/drawing/2010/main" val="0"/>
-              </a:ext>
-            </a:extLst>
-          </a:blip>
-          <a:srcRect/>
-          <a:stretch>
-            <a:fillRect/>
-          </a:stretch>
-        </p:blipFill>
-        <p:spPr bwMode="auto">
-          <a:xfrm>
-            <a:off x="8032652" y="2545117"/>
-            <a:ext cx="2561455" cy="2561455"/>
+            <a:off x="810000" y="2627801"/>
+            <a:ext cx="3966211" cy="2974658"/>
           </a:xfrm>
           <a:prstGeom prst="rect">
             <a:avLst/>
@@ -11867,33 +12618,68 @@
       </p:pic>
       <p:sp>
         <p:nvSpPr>
-          <p:cNvPr id="6" name="CuadroTexto 5"/>
-          <p:cNvSpPr txBox="1"/>
+          <p:cNvPr id="18" name="Flecha: a la derecha 17"/>
+          <p:cNvSpPr/>
           <p:nvPr/>
         </p:nvSpPr>
         <p:spPr>
           <a:xfrm>
-            <a:off x="943963" y="5363664"/>
-            <a:ext cx="2284600" cy="369332"/>
+            <a:off x="5107388" y="3883013"/>
+            <a:ext cx="2278966" cy="464233"/>
+          </a:xfrm>
+          <a:prstGeom prst="rightArrow">
+            <a:avLst/>
+          </a:prstGeom>
+        </p:spPr>
+        <p:style>
+          <a:lnRef idx="2">
+            <a:schemeClr val="accent1">
+              <a:shade val="50000"/>
+            </a:schemeClr>
+          </a:lnRef>
+          <a:fillRef idx="1">
+            <a:schemeClr val="accent1"/>
+          </a:fillRef>
+          <a:effectRef idx="0">
+            <a:schemeClr val="accent1"/>
+          </a:effectRef>
+          <a:fontRef idx="minor">
+            <a:schemeClr val="lt1"/>
+          </a:fontRef>
+        </p:style>
+        <p:txBody>
+          <a:bodyPr rtlCol="0" anchor="ctr"/>
+          <a:lstStyle/>
+          <a:p>
+            <a:pPr algn="ctr"/>
+            <a:endParaRPr lang="es-ES"/>
+          </a:p>
+        </p:txBody>
+      </p:sp>
+      <p:pic>
+        <p:nvPicPr>
+          <p:cNvPr id="19" name="Imagen 18"/>
+          <p:cNvPicPr>
+            <a:picLocks noChangeAspect="1"/>
+          </p:cNvPicPr>
+          <p:nvPr/>
+        </p:nvPicPr>
+        <p:blipFill>
+          <a:blip r:embed="rId3"/>
+          <a:stretch>
+            <a:fillRect/>
+          </a:stretch>
+        </p:blipFill>
+        <p:spPr>
+          <a:xfrm>
+            <a:off x="7836778" y="2972030"/>
+            <a:ext cx="2286198" cy="2286198"/>
           </a:xfrm>
           <a:prstGeom prst="rect">
             <a:avLst/>
           </a:prstGeom>
-          <a:noFill/>
         </p:spPr>
-        <p:txBody>
-          <a:bodyPr wrap="none" rtlCol="0">
-            <a:spAutoFit/>
-          </a:bodyPr>
-          <a:lstStyle/>
-          <a:p>
-            <a:r>
-              <a:rPr lang="es-ES" dirty="0"/>
-              <a:t>App Store (Apple)</a:t>
-            </a:r>
-          </a:p>
-        </p:txBody>
-      </p:sp>
+      </p:pic>
     </p:spTree>
     <p:extLst>
       <p:ext uri="{BB962C8B-B14F-4D97-AF65-F5344CB8AC3E}">
@@ -12223,133 +13009,208 @@
           <a:p>
             <a:r>
               <a:rPr lang="es-ES" dirty="0"/>
-              <a:t>Tiendas de videojuegos online</a:t>
+              <a:t>App store: Desarrollar</a:t>
             </a:r>
           </a:p>
         </p:txBody>
       </p:sp>
       <p:pic>
         <p:nvPicPr>
-          <p:cNvPr id="4" name="Picture 6" descr="Resultado de imagen de steam"/>
+          <p:cNvPr id="4" name="Marcador de contenido 3"/>
           <p:cNvPicPr>
-            <a:picLocks noGrp="1" noChangeAspect="1" noChangeArrowheads="1"/>
+            <a:picLocks noGrp="1" noChangeAspect="1"/>
           </p:cNvPicPr>
           <p:nvPr>
             <p:ph idx="1"/>
           </p:nvPr>
         </p:nvPicPr>
         <p:blipFill>
-          <a:blip r:embed="rId2">
-            <a:extLst>
-              <a:ext uri="{28A0092B-C50C-407E-A947-70E740481C1C}">
-                <a14:useLocalDpi xmlns:a14="http://schemas.microsoft.com/office/drawing/2010/main" val="0"/>
-              </a:ext>
-            </a:extLst>
-          </a:blip>
-          <a:srcRect/>
+          <a:blip r:embed="rId2"/>
           <a:stretch>
             <a:fillRect/>
           </a:stretch>
         </p:blipFill>
-        <p:spPr bwMode="auto">
+        <p:spPr>
           <a:xfrm>
-            <a:off x="614238" y="2882741"/>
-            <a:ext cx="2357743" cy="2357743"/>
+            <a:off x="810000" y="3249443"/>
+            <a:ext cx="1885266" cy="1885266"/>
+          </a:xfrm>
+          <a:prstGeom prst="rect">
+            <a:avLst/>
+          </a:prstGeom>
+        </p:spPr>
+      </p:pic>
+      <p:sp>
+        <p:nvSpPr>
+          <p:cNvPr id="5" name="CuadroTexto 4"/>
+          <p:cNvSpPr txBox="1"/>
+          <p:nvPr/>
+        </p:nvSpPr>
+        <p:spPr>
+          <a:xfrm>
+            <a:off x="3473294" y="3249443"/>
+            <a:ext cx="6633547" cy="1754326"/>
           </a:xfrm>
           <a:prstGeom prst="rect">
             <a:avLst/>
           </a:prstGeom>
           <a:noFill/>
-          <a:extLst>
-            <a:ext uri="{909E8E84-426E-40DD-AFC4-6F175D3DCCD1}">
-              <a14:hiddenFill xmlns:a14="http://schemas.microsoft.com/office/drawing/2010/main">
+        </p:spPr>
+        <p:txBody>
+          <a:bodyPr wrap="none" rtlCol="0">
+            <a:spAutoFit/>
+          </a:bodyPr>
+          <a:lstStyle/>
+          <a:p>
+            <a:pPr marL="285750" indent="-285750">
+              <a:buFont typeface="Arial" panose="020B0604020202020204" pitchFamily="34" charset="0"/>
+              <a:buChar char="•"/>
+            </a:pPr>
+            <a:r>
+              <a:rPr lang="es-ES" dirty="0"/>
+              <a:t>Uno de los dos mercados más importantes de software</a:t>
+            </a:r>
+          </a:p>
+          <a:p>
+            <a:pPr marL="285750" indent="-285750">
+              <a:buFont typeface="Arial" panose="020B0604020202020204" pitchFamily="34" charset="0"/>
+              <a:buChar char="•"/>
+            </a:pPr>
+            <a:r>
+              <a:rPr lang="es-ES" dirty="0"/>
+              <a:t>Registrarse como Apple </a:t>
+            </a:r>
+            <a:r>
+              <a:rPr lang="es-ES" dirty="0" err="1"/>
+              <a:t>developer</a:t>
+            </a:r>
+            <a:r>
+              <a:rPr lang="es-ES" dirty="0"/>
+              <a:t> desde</a:t>
+            </a:r>
+          </a:p>
+          <a:p>
+            <a:r>
+              <a:rPr lang="es-ES" dirty="0">
                 <a:solidFill>
-                  <a:srgbClr val="FFFFFF"/>
+                  <a:schemeClr val="accent1">
+                    <a:lumMod val="75000"/>
+                  </a:schemeClr>
                 </a:solidFill>
-              </a14:hiddenFill>
-            </a:ext>
-          </a:extLst>
-        </p:spPr>
-      </p:pic>
-      <p:pic>
-        <p:nvPicPr>
-          <p:cNvPr id="4098" name="Picture 2" descr="Resultado de imagen de PLaystation store"/>
-          <p:cNvPicPr>
-            <a:picLocks noChangeAspect="1" noChangeArrowheads="1"/>
-          </p:cNvPicPr>
+              </a:rPr>
+              <a:t> </a:t>
+            </a:r>
+            <a:r>
+              <a:rPr lang="es-ES" dirty="0">
+                <a:solidFill>
+                  <a:schemeClr val="accent1">
+                    <a:lumMod val="75000"/>
+                  </a:schemeClr>
+                </a:solidFill>
+                <a:hlinkClick r:id="rId3"/>
+              </a:rPr>
+              <a:t>http://developer.apple.com/devcenter/ios/index.action</a:t>
+            </a:r>
+            <a:endParaRPr lang="es-ES" dirty="0">
+              <a:solidFill>
+                <a:schemeClr val="accent1">
+                  <a:lumMod val="75000"/>
+                </a:schemeClr>
+              </a:solidFill>
+            </a:endParaRPr>
+          </a:p>
+          <a:p>
+            <a:pPr marL="285750" indent="-285750">
+              <a:buFont typeface="Arial" panose="020B0604020202020204" pitchFamily="34" charset="0"/>
+              <a:buChar char="•"/>
+            </a:pPr>
+            <a:r>
+              <a:rPr lang="es-ES" dirty="0"/>
+              <a:t> Entrar en el programa IOS </a:t>
+            </a:r>
+            <a:r>
+              <a:rPr lang="es-ES" dirty="0" err="1"/>
+              <a:t>Developer</a:t>
+            </a:r>
+            <a:r>
+              <a:rPr lang="es-ES" dirty="0"/>
+              <a:t> </a:t>
+            </a:r>
+            <a:r>
+              <a:rPr lang="es-ES" dirty="0" err="1"/>
+              <a:t>program</a:t>
+            </a:r>
+            <a:endParaRPr lang="es-ES" dirty="0"/>
+          </a:p>
+          <a:p>
+            <a:pPr marL="742950" lvl="1" indent="-285750">
+              <a:buFont typeface="Arial" panose="020B0604020202020204" pitchFamily="34" charset="0"/>
+              <a:buChar char="•"/>
+            </a:pPr>
+            <a:r>
+              <a:rPr lang="es-ES" dirty="0"/>
+              <a:t>Pagar la cuota anual</a:t>
+            </a:r>
+          </a:p>
+          <a:p>
+            <a:pPr marL="285750" indent="-285750">
+              <a:buFont typeface="Arial" panose="020B0604020202020204" pitchFamily="34" charset="0"/>
+              <a:buChar char="•"/>
+            </a:pPr>
+            <a:endParaRPr lang="es-ES" dirty="0"/>
+          </a:p>
+        </p:txBody>
+      </p:sp>
+      <p:sp>
+        <p:nvSpPr>
+          <p:cNvPr id="6" name="CuadroTexto 5"/>
+          <p:cNvSpPr txBox="1"/>
           <p:nvPr/>
-        </p:nvPicPr>
-        <p:blipFill>
-          <a:blip r:embed="rId3">
-            <a:extLst>
-              <a:ext uri="{28A0092B-C50C-407E-A947-70E740481C1C}">
-                <a14:useLocalDpi xmlns:a14="http://schemas.microsoft.com/office/drawing/2010/main" val="0"/>
-              </a:ext>
-            </a:extLst>
-          </a:blip>
-          <a:srcRect/>
-          <a:stretch>
-            <a:fillRect/>
-          </a:stretch>
-        </p:blipFill>
-        <p:spPr bwMode="auto">
+        </p:nvSpPr>
+        <p:spPr>
           <a:xfrm>
-            <a:off x="3368356" y="3513924"/>
-            <a:ext cx="5202067" cy="1095375"/>
-          </a:xfrm>
-          <a:prstGeom prst="rect">
-            <a:avLst/>
-          </a:prstGeom>
-          <a:solidFill>
-            <a:schemeClr val="tx1"/>
-          </a:solidFill>
-        </p:spPr>
-      </p:pic>
-      <p:pic>
-        <p:nvPicPr>
-          <p:cNvPr id="4100" name="Picture 4" descr="Resultado de imagen de xbox store"/>
-          <p:cNvPicPr>
-            <a:picLocks noChangeAspect="1" noChangeArrowheads="1"/>
-          </p:cNvPicPr>
-          <p:nvPr/>
-        </p:nvPicPr>
-        <p:blipFill>
-          <a:blip r:embed="rId4">
-            <a:extLst>
-              <a:ext uri="{28A0092B-C50C-407E-A947-70E740481C1C}">
-                <a14:useLocalDpi xmlns:a14="http://schemas.microsoft.com/office/drawing/2010/main" val="0"/>
-              </a:ext>
-            </a:extLst>
-          </a:blip>
-          <a:srcRect/>
-          <a:stretch>
-            <a:fillRect/>
-          </a:stretch>
-        </p:blipFill>
-        <p:spPr bwMode="auto">
-          <a:xfrm>
-            <a:off x="9085112" y="2943598"/>
-            <a:ext cx="2296886" cy="2296886"/>
+            <a:off x="3473294" y="4819103"/>
+            <a:ext cx="4776716" cy="369332"/>
           </a:xfrm>
           <a:prstGeom prst="rect">
             <a:avLst/>
           </a:prstGeom>
           <a:noFill/>
-          <a:extLst>
-            <a:ext uri="{909E8E84-426E-40DD-AFC4-6F175D3DCCD1}">
-              <a14:hiddenFill xmlns:a14="http://schemas.microsoft.com/office/drawing/2010/main">
-                <a:solidFill>
-                  <a:srgbClr val="FFFFFF"/>
-                </a:solidFill>
-              </a14:hiddenFill>
-            </a:ext>
-          </a:extLst>
         </p:spPr>
-      </p:pic>
+        <p:txBody>
+          <a:bodyPr wrap="square" rtlCol="0">
+            <a:spAutoFit/>
+          </a:bodyPr>
+          <a:lstStyle/>
+          <a:p>
+            <a:pPr marL="285750" indent="-285750">
+              <a:buFont typeface="Arial" panose="020B0604020202020204" pitchFamily="34" charset="0"/>
+              <a:buChar char="•"/>
+            </a:pPr>
+            <a:r>
+              <a:rPr lang="es-ES" dirty="0"/>
+              <a:t>Uso de </a:t>
+            </a:r>
+            <a:r>
+              <a:rPr lang="es-ES" dirty="0" err="1"/>
+              <a:t>Xcode</a:t>
+            </a:r>
+            <a:r>
+              <a:rPr lang="es-ES" dirty="0"/>
+              <a:t> para </a:t>
+            </a:r>
+            <a:r>
+              <a:rPr lang="es-ES" dirty="0" err="1"/>
+              <a:t>MacOS</a:t>
+            </a:r>
+            <a:endParaRPr lang="es-ES" dirty="0"/>
+          </a:p>
+        </p:txBody>
+      </p:sp>
     </p:spTree>
     <p:extLst>
       <p:ext uri="{BB962C8B-B14F-4D97-AF65-F5344CB8AC3E}">
-        <p14:creationId xmlns:p14="http://schemas.microsoft.com/office/powerpoint/2010/main" val="4058546802"/>
+        <p14:creationId xmlns:p14="http://schemas.microsoft.com/office/powerpoint/2010/main" val="823299226"/>
       </p:ext>
     </p:extLst>
   </p:cSld>
@@ -12393,99 +13254,81 @@
           <a:p>
             <a:r>
               <a:rPr lang="es-ES" dirty="0"/>
-              <a:t>Tienda de aplicaciones para Smart TV</a:t>
+              <a:t>App store: Buscar y comprar</a:t>
             </a:r>
           </a:p>
         </p:txBody>
       </p:sp>
       <p:pic>
         <p:nvPicPr>
-          <p:cNvPr id="5122" name="Picture 2" descr="Resultado de imagen de google play tv"/>
+          <p:cNvPr id="4" name="Marcador de contenido 3"/>
           <p:cNvPicPr>
-            <a:picLocks noGrp="1" noChangeAspect="1" noChangeArrowheads="1"/>
+            <a:picLocks noGrp="1" noChangeAspect="1"/>
           </p:cNvPicPr>
           <p:nvPr>
             <p:ph idx="1"/>
           </p:nvPr>
         </p:nvPicPr>
         <p:blipFill>
-          <a:blip r:embed="rId2">
-            <a:extLst>
-              <a:ext uri="{28A0092B-C50C-407E-A947-70E740481C1C}">
-                <a14:useLocalDpi xmlns:a14="http://schemas.microsoft.com/office/drawing/2010/main" val="0"/>
-              </a:ext>
-            </a:extLst>
-          </a:blip>
-          <a:srcRect/>
+          <a:blip r:embed="rId2"/>
           <a:stretch>
             <a:fillRect/>
           </a:stretch>
         </p:blipFill>
-        <p:spPr bwMode="auto">
+        <p:spPr>
           <a:xfrm>
-            <a:off x="1111348" y="2786341"/>
-            <a:ext cx="3984874" cy="2749564"/>
+            <a:off x="810000" y="3165230"/>
+            <a:ext cx="1996478" cy="1996478"/>
+          </a:xfrm>
+          <a:prstGeom prst="rect">
+            <a:avLst/>
+          </a:prstGeom>
+        </p:spPr>
+      </p:pic>
+      <p:sp>
+        <p:nvSpPr>
+          <p:cNvPr id="6" name="CuadroTexto 5"/>
+          <p:cNvSpPr txBox="1"/>
+          <p:nvPr/>
+        </p:nvSpPr>
+        <p:spPr>
+          <a:xfrm>
+            <a:off x="4094922" y="3419061"/>
+            <a:ext cx="3286539" cy="646331"/>
           </a:xfrm>
           <a:prstGeom prst="rect">
             <a:avLst/>
           </a:prstGeom>
           <a:noFill/>
-          <a:extLst>
-            <a:ext uri="{909E8E84-426E-40DD-AFC4-6F175D3DCCD1}">
-              <a14:hiddenFill xmlns:a14="http://schemas.microsoft.com/office/drawing/2010/main">
-                <a:solidFill>
-                  <a:srgbClr val="FFFFFF"/>
-                </a:solidFill>
-              </a14:hiddenFill>
-            </a:ext>
-          </a:extLst>
         </p:spPr>
-      </p:pic>
-      <p:pic>
-        <p:nvPicPr>
-          <p:cNvPr id="5124" name="Picture 4" descr="Resultado de imagen de samsung apps smart tv"/>
-          <p:cNvPicPr>
-            <a:picLocks noChangeAspect="1" noChangeArrowheads="1"/>
-          </p:cNvPicPr>
-          <p:nvPr/>
-        </p:nvPicPr>
-        <p:blipFill>
-          <a:blip r:embed="rId3">
-            <a:extLst>
-              <a:ext uri="{28A0092B-C50C-407E-A947-70E740481C1C}">
-                <a14:useLocalDpi xmlns:a14="http://schemas.microsoft.com/office/drawing/2010/main" val="0"/>
-              </a:ext>
-            </a:extLst>
-          </a:blip>
-          <a:srcRect/>
-          <a:stretch>
-            <a:fillRect/>
-          </a:stretch>
-        </p:blipFill>
-        <p:spPr bwMode="auto">
-          <a:xfrm>
-            <a:off x="5401738" y="2786341"/>
-            <a:ext cx="5509662" cy="2785784"/>
-          </a:xfrm>
-          <a:prstGeom prst="rect">
-            <a:avLst/>
-          </a:prstGeom>
-          <a:noFill/>
-          <a:extLst>
-            <a:ext uri="{909E8E84-426E-40DD-AFC4-6F175D3DCCD1}">
-              <a14:hiddenFill xmlns:a14="http://schemas.microsoft.com/office/drawing/2010/main">
-                <a:solidFill>
-                  <a:srgbClr val="FFFFFF"/>
-                </a:solidFill>
-              </a14:hiddenFill>
-            </a:ext>
-          </a:extLst>
-        </p:spPr>
-      </p:pic>
+        <p:txBody>
+          <a:bodyPr wrap="square" rtlCol="0">
+            <a:spAutoFit/>
+          </a:bodyPr>
+          <a:lstStyle/>
+          <a:p>
+            <a:pPr marL="285750" indent="-285750">
+              <a:buFont typeface="Arial" panose="020B0604020202020204" pitchFamily="34" charset="0"/>
+              <a:buChar char="•"/>
+            </a:pPr>
+            <a:r>
+              <a:rPr lang="es-ES" dirty="0"/>
+              <a:t>ID de Apple</a:t>
+            </a:r>
+          </a:p>
+          <a:p>
+            <a:pPr marL="285750" indent="-285750">
+              <a:buFont typeface="Arial" panose="020B0604020202020204" pitchFamily="34" charset="0"/>
+              <a:buChar char="•"/>
+            </a:pPr>
+            <a:endParaRPr lang="es-ES" dirty="0"/>
+          </a:p>
+        </p:txBody>
+      </p:sp>
     </p:spTree>
     <p:extLst>
       <p:ext uri="{BB962C8B-B14F-4D97-AF65-F5344CB8AC3E}">
-        <p14:creationId xmlns:p14="http://schemas.microsoft.com/office/powerpoint/2010/main" val="1546614508"/>
+        <p14:creationId xmlns:p14="http://schemas.microsoft.com/office/powerpoint/2010/main" val="2757210079"/>
       </p:ext>
     </p:extLst>
   </p:cSld>

</xml_diff>

<commit_message>
Actualizo de nuevo el powerpoint de nuevas formas de uso
</commit_message>
<xml_diff>
--- a/PM-TEMA 8 v1.pptx
+++ b/PM-TEMA 8 v1.pptx
@@ -13,16 +13,14 @@
     <p:sldId id="263" r:id="rId7"/>
     <p:sldId id="264" r:id="rId8"/>
     <p:sldId id="268" r:id="rId9"/>
-    <p:sldId id="269" r:id="rId10"/>
-    <p:sldId id="270" r:id="rId11"/>
-    <p:sldId id="271" r:id="rId12"/>
-    <p:sldId id="265" r:id="rId13"/>
-    <p:sldId id="272" r:id="rId14"/>
-    <p:sldId id="273" r:id="rId15"/>
-    <p:sldId id="274" r:id="rId16"/>
-    <p:sldId id="266" r:id="rId17"/>
-    <p:sldId id="275" r:id="rId18"/>
-    <p:sldId id="267" r:id="rId19"/>
+    <p:sldId id="270" r:id="rId10"/>
+    <p:sldId id="265" r:id="rId11"/>
+    <p:sldId id="272" r:id="rId12"/>
+    <p:sldId id="273" r:id="rId13"/>
+    <p:sldId id="274" r:id="rId14"/>
+    <p:sldId id="266" r:id="rId15"/>
+    <p:sldId id="275" r:id="rId16"/>
+    <p:sldId id="267" r:id="rId17"/>
   </p:sldIdLst>
   <p:sldSz cx="12192000" cy="6858000"/>
   <p:notesSz cx="6858000" cy="9144000"/>
@@ -11096,182 +11094,6 @@
           <a:p>
             <a:r>
               <a:rPr lang="es-ES" dirty="0"/>
-              <a:t>Google Play</a:t>
-            </a:r>
-          </a:p>
-        </p:txBody>
-      </p:sp>
-      <p:pic>
-        <p:nvPicPr>
-          <p:cNvPr id="4" name="Marcador de contenido 3"/>
-          <p:cNvPicPr>
-            <a:picLocks noGrp="1" noChangeAspect="1"/>
-          </p:cNvPicPr>
-          <p:nvPr>
-            <p:ph idx="1"/>
-          </p:nvPr>
-        </p:nvPicPr>
-        <p:blipFill>
-          <a:blip r:embed="rId2"/>
-          <a:stretch>
-            <a:fillRect/>
-          </a:stretch>
-        </p:blipFill>
-        <p:spPr>
-          <a:xfrm>
-            <a:off x="599855" y="3016521"/>
-            <a:ext cx="3029975" cy="2274005"/>
-          </a:xfrm>
-          <a:prstGeom prst="rect">
-            <a:avLst/>
-          </a:prstGeom>
-        </p:spPr>
-      </p:pic>
-    </p:spTree>
-    <p:extLst>
-      <p:ext uri="{BB962C8B-B14F-4D97-AF65-F5344CB8AC3E}">
-        <p14:creationId xmlns:p14="http://schemas.microsoft.com/office/powerpoint/2010/main" val="2474350017"/>
-      </p:ext>
-    </p:extLst>
-  </p:cSld>
-  <p:clrMapOvr>
-    <a:masterClrMapping/>
-  </p:clrMapOvr>
-</p:sld>
-</file>
-
-<file path=ppt/slides/slide11.xml><?xml version="1.0" encoding="utf-8"?>
-<p:sld xmlns:a="http://schemas.openxmlformats.org/drawingml/2006/main" xmlns:r="http://schemas.openxmlformats.org/officeDocument/2006/relationships" xmlns:p="http://schemas.openxmlformats.org/presentationml/2006/main">
-  <p:cSld>
-    <p:spTree>
-      <p:nvGrpSpPr>
-        <p:cNvPr id="1" name=""/>
-        <p:cNvGrpSpPr/>
-        <p:nvPr/>
-      </p:nvGrpSpPr>
-      <p:grpSpPr>
-        <a:xfrm>
-          <a:off x="0" y="0"/>
-          <a:ext cx="0" cy="0"/>
-          <a:chOff x="0" y="0"/>
-          <a:chExt cx="0" cy="0"/>
-        </a:xfrm>
-      </p:grpSpPr>
-      <p:sp>
-        <p:nvSpPr>
-          <p:cNvPr id="2" name="Título 1"/>
-          <p:cNvSpPr>
-            <a:spLocks noGrp="1"/>
-          </p:cNvSpPr>
-          <p:nvPr>
-            <p:ph type="title"/>
-          </p:nvPr>
-        </p:nvSpPr>
-        <p:spPr/>
-        <p:txBody>
-          <a:bodyPr/>
-          <a:lstStyle/>
-          <a:p>
-            <a:r>
-              <a:rPr lang="es-ES" dirty="0"/>
-              <a:t>Windows </a:t>
-            </a:r>
-            <a:r>
-              <a:rPr lang="es-ES" dirty="0" err="1"/>
-              <a:t>Phone</a:t>
-            </a:r>
-            <a:endParaRPr lang="es-ES" dirty="0"/>
-          </a:p>
-        </p:txBody>
-      </p:sp>
-      <p:pic>
-        <p:nvPicPr>
-          <p:cNvPr id="4" name="Picture 2" descr="Resultado de imagen de windows store"/>
-          <p:cNvPicPr>
-            <a:picLocks noGrp="1" noChangeAspect="1" noChangeArrowheads="1"/>
-          </p:cNvPicPr>
-          <p:nvPr>
-            <p:ph idx="1"/>
-          </p:nvPr>
-        </p:nvPicPr>
-        <p:blipFill rotWithShape="1">
-          <a:blip r:embed="rId2">
-            <a:extLst>
-              <a:ext uri="{28A0092B-C50C-407E-A947-70E740481C1C}">
-                <a14:useLocalDpi xmlns:a14="http://schemas.microsoft.com/office/drawing/2010/main" val="0"/>
-              </a:ext>
-            </a:extLst>
-          </a:blip>
-          <a:srcRect l="20670" t="4136" r="21223" b="3341"/>
-          <a:stretch/>
-        </p:blipFill>
-        <p:spPr bwMode="auto">
-          <a:xfrm>
-            <a:off x="1007164" y="3485321"/>
-            <a:ext cx="2773171" cy="1947631"/>
-          </a:xfrm>
-          <a:prstGeom prst="rect">
-            <a:avLst/>
-          </a:prstGeom>
-          <a:noFill/>
-          <a:extLst>
-            <a:ext uri="{909E8E84-426E-40DD-AFC4-6F175D3DCCD1}">
-              <a14:hiddenFill xmlns:a14="http://schemas.microsoft.com/office/drawing/2010/main">
-                <a:solidFill>
-                  <a:srgbClr val="FFFFFF"/>
-                </a:solidFill>
-              </a14:hiddenFill>
-            </a:ext>
-          </a:extLst>
-        </p:spPr>
-      </p:pic>
-    </p:spTree>
-    <p:extLst>
-      <p:ext uri="{BB962C8B-B14F-4D97-AF65-F5344CB8AC3E}">
-        <p14:creationId xmlns:p14="http://schemas.microsoft.com/office/powerpoint/2010/main" val="3594357224"/>
-      </p:ext>
-    </p:extLst>
-  </p:cSld>
-  <p:clrMapOvr>
-    <a:masterClrMapping/>
-  </p:clrMapOvr>
-</p:sld>
-</file>
-
-<file path=ppt/slides/slide12.xml><?xml version="1.0" encoding="utf-8"?>
-<p:sld xmlns:a="http://schemas.openxmlformats.org/drawingml/2006/main" xmlns:r="http://schemas.openxmlformats.org/officeDocument/2006/relationships" xmlns:p="http://schemas.openxmlformats.org/presentationml/2006/main">
-  <p:cSld>
-    <p:spTree>
-      <p:nvGrpSpPr>
-        <p:cNvPr id="1" name=""/>
-        <p:cNvGrpSpPr/>
-        <p:nvPr/>
-      </p:nvGrpSpPr>
-      <p:grpSpPr>
-        <a:xfrm>
-          <a:off x="0" y="0"/>
-          <a:ext cx="0" cy="0"/>
-          <a:chOff x="0" y="0"/>
-          <a:chExt cx="0" cy="0"/>
-        </a:xfrm>
-      </p:grpSpPr>
-      <p:sp>
-        <p:nvSpPr>
-          <p:cNvPr id="2" name="Título 1"/>
-          <p:cNvSpPr>
-            <a:spLocks noGrp="1"/>
-          </p:cNvSpPr>
-          <p:nvPr>
-            <p:ph type="title"/>
-          </p:nvPr>
-        </p:nvSpPr>
-        <p:spPr/>
-        <p:txBody>
-          <a:bodyPr/>
-          <a:lstStyle/>
-          <a:p>
-            <a:r>
-              <a:rPr lang="es-ES" dirty="0"/>
               <a:t>Tiendas de videojuegos online</a:t>
             </a:r>
           </a:p>
@@ -11408,7 +11230,7 @@
 </p:sld>
 </file>
 
-<file path=ppt/slides/slide13.xml><?xml version="1.0" encoding="utf-8"?>
+<file path=ppt/slides/slide11.xml><?xml version="1.0" encoding="utf-8"?>
 <p:sld xmlns:a="http://schemas.openxmlformats.org/drawingml/2006/main" xmlns:r="http://schemas.openxmlformats.org/officeDocument/2006/relationships" xmlns:p="http://schemas.openxmlformats.org/presentationml/2006/main">
   <p:cSld>
     <p:spTree>
@@ -11487,7 +11309,7 @@
 </p:sld>
 </file>
 
-<file path=ppt/slides/slide14.xml><?xml version="1.0" encoding="utf-8"?>
+<file path=ppt/slides/slide12.xml><?xml version="1.0" encoding="utf-8"?>
 <p:sld xmlns:a="http://schemas.openxmlformats.org/drawingml/2006/main" xmlns:r="http://schemas.openxmlformats.org/officeDocument/2006/relationships" xmlns:p="http://schemas.openxmlformats.org/presentationml/2006/main">
   <p:cSld>
     <p:spTree>
@@ -11573,7 +11395,7 @@
 </p:sld>
 </file>
 
-<file path=ppt/slides/slide15.xml><?xml version="1.0" encoding="utf-8"?>
+<file path=ppt/slides/slide13.xml><?xml version="1.0" encoding="utf-8"?>
 <p:sld xmlns:a="http://schemas.openxmlformats.org/drawingml/2006/main" xmlns:r="http://schemas.openxmlformats.org/officeDocument/2006/relationships" xmlns:p="http://schemas.openxmlformats.org/presentationml/2006/main">
   <p:cSld>
     <p:spTree>
@@ -11668,7 +11490,7 @@
 </p:sld>
 </file>
 
-<file path=ppt/slides/slide16.xml><?xml version="1.0" encoding="utf-8"?>
+<file path=ppt/slides/slide14.xml><?xml version="1.0" encoding="utf-8"?>
 <p:sld xmlns:a="http://schemas.openxmlformats.org/drawingml/2006/main" xmlns:r="http://schemas.openxmlformats.org/officeDocument/2006/relationships" xmlns:p="http://schemas.openxmlformats.org/presentationml/2006/main">
   <p:cSld>
     <p:spTree>
@@ -11804,7 +11626,7 @@
 </p:sld>
 </file>
 
-<file path=ppt/slides/slide17.xml><?xml version="1.0" encoding="utf-8"?>
+<file path=ppt/slides/slide15.xml><?xml version="1.0" encoding="utf-8"?>
 <p:sld xmlns:a="http://schemas.openxmlformats.org/drawingml/2006/main" xmlns:r="http://schemas.openxmlformats.org/officeDocument/2006/relationships" xmlns:p="http://schemas.openxmlformats.org/presentationml/2006/main">
   <p:cSld>
     <p:spTree>
@@ -11872,7 +11694,7 @@
 </p:sld>
 </file>
 
-<file path=ppt/slides/slide18.xml><?xml version="1.0" encoding="utf-8"?>
+<file path=ppt/slides/slide16.xml><?xml version="1.0" encoding="utf-8"?>
 <p:sld xmlns:a="http://schemas.openxmlformats.org/drawingml/2006/main" xmlns:r="http://schemas.openxmlformats.org/officeDocument/2006/relationships" xmlns:p="http://schemas.openxmlformats.org/presentationml/2006/main">
   <p:cSld>
     <p:spTree>
@@ -12872,8 +12694,8 @@
         </p:blipFill>
         <p:spPr>
           <a:xfrm>
-            <a:off x="1069144" y="2784267"/>
-            <a:ext cx="2174863" cy="2174863"/>
+            <a:off x="998577" y="3348653"/>
+            <a:ext cx="1464176" cy="1464176"/>
           </a:xfrm>
           <a:prstGeom prst="rect">
             <a:avLst/>
@@ -12903,8 +12725,8 @@
         </p:blipFill>
         <p:spPr bwMode="auto">
           <a:xfrm>
-            <a:off x="3885003" y="2735163"/>
-            <a:ext cx="3030758" cy="2273069"/>
+            <a:off x="2798790" y="3390214"/>
+            <a:ext cx="1896819" cy="1422615"/>
           </a:xfrm>
           <a:prstGeom prst="rect">
             <a:avLst/>
@@ -12929,7 +12751,7 @@
           </p:cNvPicPr>
           <p:nvPr/>
         </p:nvPicPr>
-        <p:blipFill>
+        <p:blipFill rotWithShape="1">
           <a:blip r:embed="rId4">
             <a:extLst>
               <a:ext uri="{28A0092B-C50C-407E-A947-70E740481C1C}">
@@ -12937,15 +12759,13 @@
               </a:ext>
             </a:extLst>
           </a:blip>
-          <a:srcRect/>
-          <a:stretch>
-            <a:fillRect/>
-          </a:stretch>
+          <a:srcRect l="21052" t="2667" r="21709" b="3226"/>
+          <a:stretch/>
         </p:blipFill>
         <p:spPr bwMode="auto">
           <a:xfrm>
-            <a:off x="7556758" y="3234885"/>
-            <a:ext cx="3825240" cy="1724245"/>
+            <a:off x="5022574" y="3600936"/>
+            <a:ext cx="1635318" cy="1211893"/>
           </a:xfrm>
           <a:prstGeom prst="rect">
             <a:avLst/>
@@ -12962,6 +12782,59 @@
           </a:extLst>
         </p:spPr>
       </p:pic>
+      <p:sp>
+        <p:nvSpPr>
+          <p:cNvPr id="6" name="CuadroTexto 5"/>
+          <p:cNvSpPr txBox="1"/>
+          <p:nvPr/>
+        </p:nvSpPr>
+        <p:spPr>
+          <a:xfrm>
+            <a:off x="7726017" y="3745218"/>
+            <a:ext cx="3820277" cy="923330"/>
+          </a:xfrm>
+          <a:prstGeom prst="rect">
+            <a:avLst/>
+          </a:prstGeom>
+          <a:noFill/>
+        </p:spPr>
+        <p:txBody>
+          <a:bodyPr wrap="none" rtlCol="0">
+            <a:spAutoFit/>
+          </a:bodyPr>
+          <a:lstStyle/>
+          <a:p>
+            <a:pPr marL="285750" indent="-285750">
+              <a:buFont typeface="Arial" panose="020B0604020202020204" pitchFamily="34" charset="0"/>
+              <a:buChar char="•"/>
+            </a:pPr>
+            <a:r>
+              <a:rPr lang="es-ES" dirty="0"/>
+              <a:t>Licencia freemium o lite</a:t>
+            </a:r>
+          </a:p>
+          <a:p>
+            <a:pPr marL="285750" indent="-285750">
+              <a:buFont typeface="Arial" panose="020B0604020202020204" pitchFamily="34" charset="0"/>
+              <a:buChar char="•"/>
+            </a:pPr>
+            <a:r>
+              <a:rPr lang="es-ES" dirty="0"/>
+              <a:t>Licencia gratuita (publicidad)</a:t>
+            </a:r>
+          </a:p>
+          <a:p>
+            <a:pPr marL="285750" indent="-285750">
+              <a:buFont typeface="Arial" panose="020B0604020202020204" pitchFamily="34" charset="0"/>
+              <a:buChar char="•"/>
+            </a:pPr>
+            <a:r>
+              <a:rPr lang="es-ES" dirty="0"/>
+              <a:t>Licencia de pago</a:t>
+            </a:r>
+          </a:p>
+        </p:txBody>
+      </p:sp>
     </p:spTree>
     <p:extLst>
       <p:ext uri="{BB962C8B-B14F-4D97-AF65-F5344CB8AC3E}">
@@ -13009,7 +12882,7 @@
           <a:p>
             <a:r>
               <a:rPr lang="es-ES" dirty="0"/>
-              <a:t>App store: Desarrollar</a:t>
+              <a:t>App store</a:t>
             </a:r>
           </a:p>
         </p:txBody>
@@ -13048,8 +12921,8 @@
         </p:nvSpPr>
         <p:spPr>
           <a:xfrm>
-            <a:off x="3473294" y="3249443"/>
-            <a:ext cx="6633547" cy="1754326"/>
+            <a:off x="3473294" y="2276167"/>
+            <a:ext cx="7285969" cy="3831818"/>
           </a:xfrm>
           <a:prstGeom prst="rect">
             <a:avLst/>
@@ -13063,16 +12936,22 @@
           <a:lstStyle/>
           <a:p>
             <a:pPr marL="285750" indent="-285750">
+              <a:lnSpc>
+                <a:spcPct val="250000"/>
+              </a:lnSpc>
               <a:buFont typeface="Arial" panose="020B0604020202020204" pitchFamily="34" charset="0"/>
               <a:buChar char="•"/>
             </a:pPr>
             <a:r>
               <a:rPr lang="es-ES" dirty="0"/>
-              <a:t>Uno de los dos mercados más importantes de software</a:t>
+              <a:t>Uno de los dos mercados más importantes de software móvil</a:t>
             </a:r>
           </a:p>
           <a:p>
             <a:pPr marL="285750" indent="-285750">
+              <a:lnSpc>
+                <a:spcPct val="250000"/>
+              </a:lnSpc>
               <a:buFont typeface="Arial" panose="020B0604020202020204" pitchFamily="34" charset="0"/>
               <a:buChar char="•"/>
             </a:pPr>
@@ -13090,6 +12969,11 @@
             </a:r>
           </a:p>
           <a:p>
+            <a:pPr>
+              <a:lnSpc>
+                <a:spcPct val="250000"/>
+              </a:lnSpc>
+            </a:pPr>
             <a:r>
               <a:rPr lang="es-ES" dirty="0">
                 <a:solidFill>
@@ -13121,6 +13005,9 @@
           </a:p>
           <a:p>
             <a:pPr marL="285750" indent="-285750">
+              <a:lnSpc>
+                <a:spcPct val="250000"/>
+              </a:lnSpc>
               <a:buFont typeface="Arial" panose="020B0604020202020204" pitchFamily="34" charset="0"/>
               <a:buChar char="•"/>
             </a:pPr>
@@ -13144,6 +13031,9 @@
           </a:p>
           <a:p>
             <a:pPr marL="742950" lvl="1" indent="-285750">
+              <a:lnSpc>
+                <a:spcPct val="250000"/>
+              </a:lnSpc>
               <a:buFont typeface="Arial" panose="020B0604020202020204" pitchFamily="34" charset="0"/>
               <a:buChar char="•"/>
             </a:pPr>
@@ -13169,7 +13059,7 @@
         </p:nvSpPr>
         <p:spPr>
           <a:xfrm>
-            <a:off x="3473294" y="4819103"/>
+            <a:off x="3473294" y="5923319"/>
             <a:ext cx="4776716" cy="369332"/>
           </a:xfrm>
           <a:prstGeom prst="rect">
@@ -13254,7 +13144,7 @@
           <a:p>
             <a:r>
               <a:rPr lang="es-ES" dirty="0"/>
-              <a:t>App store: Buscar y comprar</a:t>
+              <a:t>Google Play</a:t>
             </a:r>
           </a:p>
         </p:txBody>
@@ -13277,8 +13167,8 @@
         </p:blipFill>
         <p:spPr>
           <a:xfrm>
-            <a:off x="810000" y="3165230"/>
-            <a:ext cx="1996478" cy="1996478"/>
+            <a:off x="584206" y="3233531"/>
+            <a:ext cx="2740824" cy="2056996"/>
           </a:xfrm>
           <a:prstGeom prst="rect">
             <a:avLst/>
@@ -13293,8 +13183,8 @@
         </p:nvSpPr>
         <p:spPr>
           <a:xfrm>
-            <a:off x="4094922" y="3419061"/>
-            <a:ext cx="3286539" cy="646331"/>
+            <a:off x="3208450" y="2682120"/>
+            <a:ext cx="8983550" cy="5216813"/>
           </a:xfrm>
           <a:prstGeom prst="rect">
             <a:avLst/>
@@ -13302,22 +13192,105 @@
           <a:noFill/>
         </p:spPr>
         <p:txBody>
-          <a:bodyPr wrap="square" rtlCol="0">
+          <a:bodyPr wrap="none" rtlCol="0">
             <a:spAutoFit/>
           </a:bodyPr>
           <a:lstStyle/>
           <a:p>
             <a:pPr marL="285750" indent="-285750">
+              <a:lnSpc>
+                <a:spcPct val="250000"/>
+              </a:lnSpc>
               <a:buFont typeface="Arial" panose="020B0604020202020204" pitchFamily="34" charset="0"/>
               <a:buChar char="•"/>
             </a:pPr>
             <a:r>
               <a:rPr lang="es-ES" dirty="0"/>
-              <a:t>ID de Apple</a:t>
+              <a:t>El otro de los dos mercados más importantes de software para smartphones</a:t>
             </a:r>
           </a:p>
           <a:p>
             <a:pPr marL="285750" indent="-285750">
+              <a:lnSpc>
+                <a:spcPct val="250000"/>
+              </a:lnSpc>
+              <a:buFont typeface="Arial" panose="020B0604020202020204" pitchFamily="34" charset="0"/>
+              <a:buChar char="•"/>
+            </a:pPr>
+            <a:r>
+              <a:rPr lang="es-ES" dirty="0"/>
+              <a:t>Registrarse como desarrollador desde</a:t>
+            </a:r>
+          </a:p>
+          <a:p>
+            <a:pPr>
+              <a:lnSpc>
+                <a:spcPct val="250000"/>
+              </a:lnSpc>
+            </a:pPr>
+            <a:r>
+              <a:rPr lang="es-ES" dirty="0"/>
+              <a:t>     </a:t>
+            </a:r>
+            <a:r>
+              <a:rPr lang="es-ES" dirty="0">
+                <a:hlinkClick r:id="rId3"/>
+              </a:rPr>
+              <a:t>https://play.google.com/apps/publish/signup/</a:t>
+            </a:r>
+            <a:endParaRPr lang="es-ES" dirty="0"/>
+          </a:p>
+          <a:p>
+            <a:pPr marL="285750" indent="-285750">
+              <a:lnSpc>
+                <a:spcPct val="250000"/>
+              </a:lnSpc>
+              <a:buFont typeface="Arial" panose="020B0604020202020204" pitchFamily="34" charset="0"/>
+              <a:buChar char="•"/>
+            </a:pPr>
+            <a:r>
+              <a:rPr lang="es-ES" dirty="0"/>
+              <a:t>Aceptar el acuerdo de distribución para desarrolladores</a:t>
+            </a:r>
+          </a:p>
+          <a:p>
+            <a:pPr marL="742950" lvl="1" indent="-285750">
+              <a:lnSpc>
+                <a:spcPct val="250000"/>
+              </a:lnSpc>
+              <a:buFont typeface="Arial" panose="020B0604020202020204" pitchFamily="34" charset="0"/>
+              <a:buChar char="•"/>
+            </a:pPr>
+            <a:r>
+              <a:rPr lang="es-ES" dirty="0"/>
+              <a:t>Pagar la cuota de registro única.</a:t>
+            </a:r>
+          </a:p>
+          <a:p>
+            <a:pPr marL="285750" indent="-285750">
+              <a:lnSpc>
+                <a:spcPct val="250000"/>
+              </a:lnSpc>
+              <a:buFont typeface="Arial" panose="020B0604020202020204" pitchFamily="34" charset="0"/>
+              <a:buChar char="•"/>
+            </a:pPr>
+            <a:endParaRPr lang="es-ES" dirty="0"/>
+          </a:p>
+          <a:p>
+            <a:pPr marL="285750" indent="-285750">
+              <a:lnSpc>
+                <a:spcPct val="250000"/>
+              </a:lnSpc>
+              <a:buFont typeface="Arial" panose="020B0604020202020204" pitchFamily="34" charset="0"/>
+              <a:buChar char="•"/>
+            </a:pPr>
+            <a:r>
+              <a:rPr lang="es-ES" dirty="0"/>
+              <a:t>Uso de Android Studio o SDK de Android</a:t>
+            </a:r>
+          </a:p>
+          <a:p>
+            <a:pPr marL="742950" lvl="1" indent="-285750">
               <a:buFont typeface="Arial" panose="020B0604020202020204" pitchFamily="34" charset="0"/>
               <a:buChar char="•"/>
             </a:pPr>
@@ -13328,7 +13301,7 @@
     </p:spTree>
     <p:extLst>
       <p:ext uri="{BB962C8B-B14F-4D97-AF65-F5344CB8AC3E}">
-        <p14:creationId xmlns:p14="http://schemas.microsoft.com/office/powerpoint/2010/main" val="2757210079"/>
+        <p14:creationId xmlns:p14="http://schemas.microsoft.com/office/powerpoint/2010/main" val="2474350017"/>
       </p:ext>
     </p:extLst>
   </p:cSld>

</xml_diff>